<commit_message>
New mofied PPF added new examples added as below
Out parameters
In parameters
Parameter array (Params)
Default Or Optional parameter
</commit_message>
<xml_diff>
--- a/PPT/C# Class structure and objects.pptx
+++ b/PPT/C# Class structure and objects.pptx
@@ -32,8 +32,16 @@
     <p:sldId id="284" r:id="rId26"/>
     <p:sldId id="285" r:id="rId27"/>
     <p:sldId id="286" r:id="rId28"/>
-    <p:sldId id="273" r:id="rId29"/>
-    <p:sldId id="279" r:id="rId30"/>
+    <p:sldId id="287" r:id="rId29"/>
+    <p:sldId id="288" r:id="rId30"/>
+    <p:sldId id="289" r:id="rId31"/>
+    <p:sldId id="290" r:id="rId32"/>
+    <p:sldId id="293" r:id="rId33"/>
+    <p:sldId id="291" r:id="rId34"/>
+    <p:sldId id="292" r:id="rId35"/>
+    <p:sldId id="294" r:id="rId36"/>
+    <p:sldId id="273" r:id="rId37"/>
+    <p:sldId id="279" r:id="rId38"/>
   </p:sldIdLst>
   <p:sldSz cx="11887200" cy="5715000"/>
   <p:notesSz cx="6858000" cy="9144000"/>
@@ -282,7 +290,7 @@
             <a:fld id="{1D8BD707-D9CF-40AE-B4C6-C98DA3205C09}" type="datetimeFigureOut">
               <a:rPr lang="en-US" smtClean="0"/>
               <a:pPr/>
-              <a:t>5/21/2024</a:t>
+              <a:t>5/22/2024</a:t>
             </a:fld>
             <a:endParaRPr lang="en-US"/>
           </a:p>
@@ -582,7 +590,7 @@
             <a:fld id="{1D8BD707-D9CF-40AE-B4C6-C98DA3205C09}" type="datetimeFigureOut">
               <a:rPr lang="en-US" smtClean="0"/>
               <a:pPr/>
-              <a:t>5/21/2024</a:t>
+              <a:t>5/22/2024</a:t>
             </a:fld>
             <a:endParaRPr lang="en-US"/>
           </a:p>
@@ -758,7 +766,7 @@
             <a:fld id="{1D8BD707-D9CF-40AE-B4C6-C98DA3205C09}" type="datetimeFigureOut">
               <a:rPr lang="en-US" smtClean="0"/>
               <a:pPr/>
-              <a:t>5/21/2024</a:t>
+              <a:t>5/22/2024</a:t>
             </a:fld>
             <a:endParaRPr lang="en-US"/>
           </a:p>
@@ -924,7 +932,7 @@
             <a:fld id="{1D8BD707-D9CF-40AE-B4C6-C98DA3205C09}" type="datetimeFigureOut">
               <a:rPr lang="en-US" smtClean="0"/>
               <a:pPr/>
-              <a:t>5/21/2024</a:t>
+              <a:t>5/22/2024</a:t>
             </a:fld>
             <a:endParaRPr lang="en-US"/>
           </a:p>
@@ -1185,7 +1193,7 @@
             <a:fld id="{1D8BD707-D9CF-40AE-B4C6-C98DA3205C09}" type="datetimeFigureOut">
               <a:rPr lang="en-US" smtClean="0"/>
               <a:pPr/>
-              <a:t>5/21/2024</a:t>
+              <a:t>5/22/2024</a:t>
             </a:fld>
             <a:endParaRPr lang="en-US"/>
           </a:p>
@@ -1640,7 +1648,7 @@
             <a:fld id="{1D8BD707-D9CF-40AE-B4C6-C98DA3205C09}" type="datetimeFigureOut">
               <a:rPr lang="en-US" smtClean="0"/>
               <a:pPr/>
-              <a:t>5/21/2024</a:t>
+              <a:t>5/22/2024</a:t>
             </a:fld>
             <a:endParaRPr lang="en-US"/>
           </a:p>
@@ -2124,7 +2132,7 @@
             <a:fld id="{1D8BD707-D9CF-40AE-B4C6-C98DA3205C09}" type="datetimeFigureOut">
               <a:rPr lang="en-US" smtClean="0"/>
               <a:pPr/>
-              <a:t>5/21/2024</a:t>
+              <a:t>5/22/2024</a:t>
             </a:fld>
             <a:endParaRPr lang="en-US"/>
           </a:p>
@@ -2243,7 +2251,7 @@
             <a:fld id="{1D8BD707-D9CF-40AE-B4C6-C98DA3205C09}" type="datetimeFigureOut">
               <a:rPr lang="en-US" smtClean="0"/>
               <a:pPr/>
-              <a:t>5/21/2024</a:t>
+              <a:t>5/22/2024</a:t>
             </a:fld>
             <a:endParaRPr lang="en-US"/>
           </a:p>
@@ -2381,7 +2389,7 @@
             <a:fld id="{1D8BD707-D9CF-40AE-B4C6-C98DA3205C09}" type="datetimeFigureOut">
               <a:rPr lang="en-US" smtClean="0"/>
               <a:pPr/>
-              <a:t>5/21/2024</a:t>
+              <a:t>5/22/2024</a:t>
             </a:fld>
             <a:endParaRPr lang="en-US"/>
           </a:p>
@@ -2696,7 +2704,7 @@
             <a:fld id="{1D8BD707-D9CF-40AE-B4C6-C98DA3205C09}" type="datetimeFigureOut">
               <a:rPr lang="en-US" smtClean="0"/>
               <a:pPr/>
-              <a:t>5/21/2024</a:t>
+              <a:t>5/22/2024</a:t>
             </a:fld>
             <a:endParaRPr lang="en-US"/>
           </a:p>
@@ -2825,7 +2833,7 @@
             <a:fld id="{1D8BD707-D9CF-40AE-B4C6-C98DA3205C09}" type="datetimeFigureOut">
               <a:rPr lang="en-US" smtClean="0"/>
               <a:pPr/>
-              <a:t>5/21/2024</a:t>
+              <a:t>5/22/2024</a:t>
             </a:fld>
             <a:endParaRPr lang="en-US"/>
           </a:p>
@@ -3584,7 +3592,7 @@
             <a:fld id="{1D8BD707-D9CF-40AE-B4C6-C98DA3205C09}" type="datetimeFigureOut">
               <a:rPr lang="en-US" smtClean="0"/>
               <a:pPr/>
-              <a:t>5/21/2024</a:t>
+              <a:t>5/22/2024</a:t>
             </a:fld>
             <a:endParaRPr lang="en-US"/>
           </a:p>
@@ -7988,7 +7996,7 @@
         <p:spPr/>
         <p:txBody>
           <a:bodyPr>
-            <a:normAutofit fontScale="92500" lnSpcReduction="20000"/>
+            <a:normAutofit fontScale="85000" lnSpcReduction="20000"/>
           </a:bodyPr>
           <a:lstStyle/>
           <a:p>
@@ -8024,13 +8032,13 @@
           <a:p>
             <a:r>
               <a:rPr lang="en-IN" dirty="0"/>
-              <a:t>Parameter array</a:t>
+              <a:t>Parameter array (Params)</a:t>
             </a:r>
           </a:p>
           <a:p>
             <a:r>
               <a:rPr lang="en-IN" dirty="0"/>
-              <a:t>Default parameter</a:t>
+              <a:t>Default Or Optional parameter</a:t>
             </a:r>
           </a:p>
           <a:p>
@@ -8129,9 +8137,6 @@
           <a:bodyPr/>
           <a:lstStyle/>
           <a:p>
-            <a:pPr marL="82293" indent="0">
-              <a:buNone/>
-            </a:pPr>
             <a:r>
               <a:rPr lang="en-US" b="0" i="0" dirty="0">
                 <a:solidFill>
@@ -8143,7 +8148,22 @@
                 </a:highlight>
                 <a:latin typeface="Nunito" pitchFamily="2" charset="0"/>
               </a:rPr>
-              <a:t>	Using named parameters, you can specify the value of the parameter according to their names not their order in the method. Or in other words, it provides us a facility to not remember parameters according to their order</a:t>
+              <a:t>Using named parameters, you can specify the value of the parameter according to their names not their order in the method. </a:t>
+            </a:r>
+          </a:p>
+          <a:p>
+            <a:r>
+              <a:rPr lang="en-US" b="0" i="0" dirty="0">
+                <a:solidFill>
+                  <a:srgbClr val="273239"/>
+                </a:solidFill>
+                <a:effectLst/>
+                <a:highlight>
+                  <a:srgbClr val="FFFFFF"/>
+                </a:highlight>
+                <a:latin typeface="Nunito" pitchFamily="2" charset="0"/>
+              </a:rPr>
+              <a:t>it provides us a facility to not remember parameters according to their order</a:t>
             </a:r>
             <a:endParaRPr lang="en-IN" dirty="0"/>
           </a:p>
@@ -8545,7 +8565,37 @@
                 </a:highlight>
                 <a:latin typeface="Nunito" pitchFamily="2" charset="0"/>
               </a:rPr>
-              <a:t>It is a normal value parameter in a method or you can say the passing of value types by value. So when the variables are passed as value type they contain the data or value, not any reference. If you will make any changes in the value type parameter then it will not reflect the original value stored as an argument.</a:t>
+              <a:t>It is a normal value parameter in a method or you can say the passing of value types by value. </a:t>
+            </a:r>
+          </a:p>
+          <a:p>
+            <a:r>
+              <a:rPr lang="en-US" b="0" i="0" dirty="0">
+                <a:solidFill>
+                  <a:srgbClr val="273239"/>
+                </a:solidFill>
+                <a:effectLst/>
+                <a:highlight>
+                  <a:srgbClr val="FFFFFF"/>
+                </a:highlight>
+                <a:latin typeface="Nunito" pitchFamily="2" charset="0"/>
+              </a:rPr>
+              <a:t>when the variables are passed as value type they contain the data or value, not any reference. </a:t>
+            </a:r>
+          </a:p>
+          <a:p>
+            <a:r>
+              <a:rPr lang="en-US" b="0" i="0" dirty="0">
+                <a:solidFill>
+                  <a:srgbClr val="273239"/>
+                </a:solidFill>
+                <a:effectLst/>
+                <a:highlight>
+                  <a:srgbClr val="FFFFFF"/>
+                </a:highlight>
+                <a:latin typeface="Nunito" pitchFamily="2" charset="0"/>
+              </a:rPr>
+              <a:t>If you will make any changes in the value type parameter then it will not reflect the original value stored as an argument.</a:t>
             </a:r>
             <a:endParaRPr lang="en-IN" dirty="0"/>
           </a:p>
@@ -8854,41 +8904,7 @@
                 <a:ea typeface="+mn-ea"/>
                 <a:cs typeface="Calibri Light" panose="020F0302020204030204" pitchFamily="34" charset="0"/>
               </a:rPr>
-              <a:t>Console.WriteLine("before change </a:t>
-            </a:r>
-            <a:r>
-              <a:rPr kumimoji="0" lang="en-IN" sz="1800" b="0" i="0" u="none" strike="noStrike" kern="1200" cap="none" spc="0" normalizeH="0" baseline="0" noProof="0" dirty="0" err="1">
-                <a:ln>
-                  <a:noFill/>
-                </a:ln>
-                <a:solidFill>
-                  <a:prstClr val="black"/>
-                </a:solidFill>
-                <a:effectLst/>
-                <a:uLnTx/>
-                <a:uFillTx/>
-                <a:latin typeface="Calibri Light" panose="020F0302020204030204" pitchFamily="34" charset="0"/>
-                <a:ea typeface="+mn-ea"/>
-                <a:cs typeface="Calibri Light" panose="020F0302020204030204" pitchFamily="34" charset="0"/>
-              </a:rPr>
-              <a:t>ss"+ss</a:t>
-            </a:r>
-            <a:r>
-              <a:rPr kumimoji="0" lang="en-IN" sz="1800" b="0" i="0" u="none" strike="noStrike" kern="1200" cap="none" spc="0" normalizeH="0" baseline="0" noProof="0" dirty="0">
-                <a:ln>
-                  <a:noFill/>
-                </a:ln>
-                <a:solidFill>
-                  <a:prstClr val="black"/>
-                </a:solidFill>
-                <a:effectLst/>
-                <a:uLnTx/>
-                <a:uFillTx/>
-                <a:latin typeface="Calibri Light" panose="020F0302020204030204" pitchFamily="34" charset="0"/>
-                <a:ea typeface="+mn-ea"/>
-                <a:cs typeface="Calibri Light" panose="020F0302020204030204" pitchFamily="34" charset="0"/>
-              </a:rPr>
-              <a:t>+" n="+n);       </a:t>
+              <a:t>Console.WriteLine("before change ss="+ss+" n="+n);       </a:t>
             </a:r>
           </a:p>
           <a:p>
@@ -8934,41 +8950,7 @@
                 <a:ea typeface="+mn-ea"/>
                 <a:cs typeface="Calibri Light" panose="020F0302020204030204" pitchFamily="34" charset="0"/>
               </a:rPr>
-              <a:t> ss="</a:t>
-            </a:r>
-            <a:r>
-              <a:rPr kumimoji="0" lang="en-IN" sz="1800" b="0" i="0" u="none" strike="noStrike" kern="1200" cap="none" spc="0" normalizeH="0" baseline="0" noProof="0" dirty="0" err="1">
-                <a:ln>
-                  <a:noFill/>
-                </a:ln>
-                <a:solidFill>
-                  <a:prstClr val="black"/>
-                </a:solidFill>
-                <a:effectLst/>
-                <a:uLnTx/>
-                <a:uFillTx/>
-                <a:latin typeface="Calibri Light" panose="020F0302020204030204" pitchFamily="34" charset="0"/>
-                <a:ea typeface="+mn-ea"/>
-                <a:cs typeface="Calibri Light" panose="020F0302020204030204" pitchFamily="34" charset="0"/>
-              </a:rPr>
-              <a:t>abcd</a:t>
-            </a:r>
-            <a:r>
-              <a:rPr kumimoji="0" lang="en-IN" sz="1800" b="0" i="0" u="none" strike="noStrike" kern="1200" cap="none" spc="0" normalizeH="0" baseline="0" noProof="0" dirty="0">
-                <a:ln>
-                  <a:noFill/>
-                </a:ln>
-                <a:solidFill>
-                  <a:prstClr val="black"/>
-                </a:solidFill>
-                <a:effectLst/>
-                <a:uLnTx/>
-                <a:uFillTx/>
-                <a:latin typeface="Calibri Light" panose="020F0302020204030204" pitchFamily="34" charset="0"/>
-                <a:ea typeface="+mn-ea"/>
-                <a:cs typeface="Calibri Light" panose="020F0302020204030204" pitchFamily="34" charset="0"/>
-              </a:rPr>
-              <a:t>";        </a:t>
+              <a:t> ss=“Nashik";        </a:t>
             </a:r>
           </a:p>
           <a:p>
@@ -9430,41 +9412,7 @@
                 <a:ea typeface="+mn-ea"/>
                 <a:cs typeface="Calibri Light" panose="020F0302020204030204" pitchFamily="34" charset="0"/>
               </a:rPr>
-              <a:t>string </a:t>
-            </a:r>
-            <a:r>
-              <a:rPr kumimoji="0" lang="en-IN" sz="1800" b="0" i="0" u="none" strike="noStrike" kern="1200" cap="none" spc="0" normalizeH="0" baseline="0" noProof="0" dirty="0" err="1">
-                <a:ln>
-                  <a:noFill/>
-                </a:ln>
-                <a:solidFill>
-                  <a:prstClr val="black"/>
-                </a:solidFill>
-                <a:effectLst/>
-                <a:uLnTx/>
-                <a:uFillTx/>
-                <a:latin typeface="Calibri Light" panose="020F0302020204030204" pitchFamily="34" charset="0"/>
-                <a:ea typeface="+mn-ea"/>
-                <a:cs typeface="Calibri Light" panose="020F0302020204030204" pitchFamily="34" charset="0"/>
-              </a:rPr>
-              <a:t>tt</a:t>
-            </a:r>
-            <a:r>
-              <a:rPr kumimoji="0" lang="en-IN" sz="1800" b="0" i="0" u="none" strike="noStrike" kern="1200" cap="none" spc="0" normalizeH="0" baseline="0" noProof="0" dirty="0">
-                <a:ln>
-                  <a:noFill/>
-                </a:ln>
-                <a:solidFill>
-                  <a:prstClr val="black"/>
-                </a:solidFill>
-                <a:effectLst/>
-                <a:uLnTx/>
-                <a:uFillTx/>
-                <a:latin typeface="Calibri Light" panose="020F0302020204030204" pitchFamily="34" charset="0"/>
-                <a:ea typeface="+mn-ea"/>
-                <a:cs typeface="Calibri Light" panose="020F0302020204030204" pitchFamily="34" charset="0"/>
-              </a:rPr>
-              <a:t>="xxx";        </a:t>
+              <a:t>string tt=“Pune";        </a:t>
             </a:r>
           </a:p>
           <a:p>
@@ -9556,41 +9504,7 @@
                 <a:ea typeface="+mn-ea"/>
                 <a:cs typeface="Calibri Light" panose="020F0302020204030204" pitchFamily="34" charset="0"/>
               </a:rPr>
-              <a:t>t1.valueParaDemo(</a:t>
-            </a:r>
-            <a:r>
-              <a:rPr kumimoji="0" lang="en-IN" sz="1800" b="0" i="0" u="none" strike="noStrike" kern="1200" cap="none" spc="0" normalizeH="0" baseline="0" noProof="0" dirty="0" err="1">
-                <a:ln>
-                  <a:noFill/>
-                </a:ln>
-                <a:solidFill>
-                  <a:prstClr val="black"/>
-                </a:solidFill>
-                <a:effectLst/>
-                <a:uLnTx/>
-                <a:uFillTx/>
-                <a:latin typeface="Calibri Light" panose="020F0302020204030204" pitchFamily="34" charset="0"/>
-                <a:ea typeface="+mn-ea"/>
-                <a:cs typeface="Calibri Light" panose="020F0302020204030204" pitchFamily="34" charset="0"/>
-              </a:rPr>
-              <a:t>tt</a:t>
-            </a:r>
-            <a:r>
-              <a:rPr kumimoji="0" lang="en-IN" sz="1800" b="0" i="0" u="none" strike="noStrike" kern="1200" cap="none" spc="0" normalizeH="0" baseline="0" noProof="0" dirty="0">
-                <a:ln>
-                  <a:noFill/>
-                </a:ln>
-                <a:solidFill>
-                  <a:prstClr val="black"/>
-                </a:solidFill>
-                <a:effectLst/>
-                <a:uLnTx/>
-                <a:uFillTx/>
-                <a:latin typeface="Calibri Light" panose="020F0302020204030204" pitchFamily="34" charset="0"/>
-                <a:ea typeface="+mn-ea"/>
-                <a:cs typeface="Calibri Light" panose="020F0302020204030204" pitchFamily="34" charset="0"/>
-              </a:rPr>
-              <a:t> , no);        </a:t>
+              <a:t>t1.valueParaDemo(tt , no);        </a:t>
             </a:r>
           </a:p>
           <a:p>
@@ -9636,75 +9550,7 @@
                 <a:ea typeface="+mn-ea"/>
                 <a:cs typeface="Calibri Light" panose="020F0302020204030204" pitchFamily="34" charset="0"/>
               </a:rPr>
-              <a:t>Console.WriteLine("after method call </a:t>
-            </a:r>
-            <a:r>
-              <a:rPr kumimoji="0" lang="en-IN" sz="1800" b="0" i="0" u="none" strike="noStrike" kern="1200" cap="none" spc="0" normalizeH="0" baseline="0" noProof="0" dirty="0" err="1">
-                <a:ln>
-                  <a:noFill/>
-                </a:ln>
-                <a:solidFill>
-                  <a:prstClr val="black"/>
-                </a:solidFill>
-                <a:effectLst/>
-                <a:uLnTx/>
-                <a:uFillTx/>
-                <a:latin typeface="Calibri Light" panose="020F0302020204030204" pitchFamily="34" charset="0"/>
-                <a:ea typeface="+mn-ea"/>
-                <a:cs typeface="Calibri Light" panose="020F0302020204030204" pitchFamily="34" charset="0"/>
-              </a:rPr>
-              <a:t>tt</a:t>
-            </a:r>
-            <a:r>
-              <a:rPr kumimoji="0" lang="en-IN" sz="1800" b="0" i="0" u="none" strike="noStrike" kern="1200" cap="none" spc="0" normalizeH="0" baseline="0" noProof="0" dirty="0">
-                <a:ln>
-                  <a:noFill/>
-                </a:ln>
-                <a:solidFill>
-                  <a:prstClr val="black"/>
-                </a:solidFill>
-                <a:effectLst/>
-                <a:uLnTx/>
-                <a:uFillTx/>
-                <a:latin typeface="Calibri Light" panose="020F0302020204030204" pitchFamily="34" charset="0"/>
-                <a:ea typeface="+mn-ea"/>
-                <a:cs typeface="Calibri Light" panose="020F0302020204030204" pitchFamily="34" charset="0"/>
-              </a:rPr>
-              <a:t> = "+</a:t>
-            </a:r>
-            <a:r>
-              <a:rPr kumimoji="0" lang="en-IN" sz="1800" b="0" i="0" u="none" strike="noStrike" kern="1200" cap="none" spc="0" normalizeH="0" baseline="0" noProof="0" dirty="0" err="1">
-                <a:ln>
-                  <a:noFill/>
-                </a:ln>
-                <a:solidFill>
-                  <a:prstClr val="black"/>
-                </a:solidFill>
-                <a:effectLst/>
-                <a:uLnTx/>
-                <a:uFillTx/>
-                <a:latin typeface="Calibri Light" panose="020F0302020204030204" pitchFamily="34" charset="0"/>
-                <a:ea typeface="+mn-ea"/>
-                <a:cs typeface="Calibri Light" panose="020F0302020204030204" pitchFamily="34" charset="0"/>
-              </a:rPr>
-              <a:t>tt</a:t>
-            </a:r>
-            <a:r>
-              <a:rPr kumimoji="0" lang="en-IN" sz="1800" b="0" i="0" u="none" strike="noStrike" kern="1200" cap="none" spc="0" normalizeH="0" baseline="0" noProof="0" dirty="0">
-                <a:ln>
-                  <a:noFill/>
-                </a:ln>
-                <a:solidFill>
-                  <a:prstClr val="black"/>
-                </a:solidFill>
-                <a:effectLst/>
-                <a:uLnTx/>
-                <a:uFillTx/>
-                <a:latin typeface="Calibri Light" panose="020F0302020204030204" pitchFamily="34" charset="0"/>
-                <a:ea typeface="+mn-ea"/>
-                <a:cs typeface="Calibri Light" panose="020F0302020204030204" pitchFamily="34" charset="0"/>
-              </a:rPr>
-              <a:t>+" no="+no);             </a:t>
+              <a:t>Console.WriteLine("after method call tt = "+tt+" no="+no);             </a:t>
             </a:r>
           </a:p>
           <a:p>
@@ -9815,8 +9661,8 @@
         </p:nvSpPr>
         <p:spPr>
           <a:xfrm>
-            <a:off x="7467600" y="3009900"/>
-            <a:ext cx="4343400" cy="1477328"/>
+            <a:off x="7162800" y="2552700"/>
+            <a:ext cx="4876800" cy="1631216"/>
           </a:xfrm>
           <a:prstGeom prst="rect">
             <a:avLst/>
@@ -9835,53 +9681,44 @@
           <a:lstStyle/>
           <a:p>
             <a:r>
-              <a:rPr lang="en-IN" dirty="0"/>
+              <a:rPr lang="en-IN" sz="2000" dirty="0">
+                <a:latin typeface="Calibri" panose="020F0502020204030204" pitchFamily="34" charset="0"/>
+                <a:cs typeface="Calibri" panose="020F0502020204030204" pitchFamily="34" charset="0"/>
+              </a:rPr>
               <a:t>Output</a:t>
             </a:r>
           </a:p>
           <a:p>
-            <a:endParaRPr lang="en-IN" dirty="0"/>
-          </a:p>
-          <a:p>
-            <a:r>
-              <a:rPr lang="en-IN" dirty="0"/>
-              <a:t>before change </a:t>
-            </a:r>
-            <a:r>
-              <a:rPr lang="en-IN" dirty="0" err="1"/>
-              <a:t>ssxxx</a:t>
-            </a:r>
-            <a:r>
-              <a:rPr lang="en-IN" dirty="0"/>
-              <a:t> n=111</a:t>
-            </a:r>
-          </a:p>
-          <a:p>
-            <a:r>
-              <a:rPr lang="en-IN" dirty="0"/>
-              <a:t>after change inside method ss=</a:t>
-            </a:r>
-            <a:r>
-              <a:rPr lang="en-IN" dirty="0" err="1"/>
-              <a:t>abcd</a:t>
-            </a:r>
-            <a:r>
-              <a:rPr lang="en-IN" dirty="0"/>
-              <a:t> n=999</a:t>
-            </a:r>
-          </a:p>
-          <a:p>
-            <a:r>
-              <a:rPr lang="en-IN" dirty="0"/>
-              <a:t>after method call </a:t>
-            </a:r>
-            <a:r>
-              <a:rPr lang="en-IN" dirty="0" err="1"/>
-              <a:t>tt</a:t>
-            </a:r>
-            <a:r>
-              <a:rPr lang="en-IN" dirty="0"/>
-              <a:t>= xxx no=111</a:t>
+            <a:endParaRPr lang="en-IN" sz="2000" dirty="0">
+              <a:latin typeface="Calibri" panose="020F0502020204030204" pitchFamily="34" charset="0"/>
+              <a:cs typeface="Calibri" panose="020F0502020204030204" pitchFamily="34" charset="0"/>
+            </a:endParaRPr>
+          </a:p>
+          <a:p>
+            <a:r>
+              <a:rPr lang="en-IN" sz="2000" dirty="0">
+                <a:latin typeface="Calibri" panose="020F0502020204030204" pitchFamily="34" charset="0"/>
+                <a:cs typeface="Calibri" panose="020F0502020204030204" pitchFamily="34" charset="0"/>
+              </a:rPr>
+              <a:t>before change ss=Pune n=111</a:t>
+            </a:r>
+          </a:p>
+          <a:p>
+            <a:r>
+              <a:rPr lang="en-IN" sz="2000" dirty="0">
+                <a:latin typeface="Calibri" panose="020F0502020204030204" pitchFamily="34" charset="0"/>
+                <a:cs typeface="Calibri" panose="020F0502020204030204" pitchFamily="34" charset="0"/>
+              </a:rPr>
+              <a:t>after change inside method ss=Nashik n=999</a:t>
+            </a:r>
+          </a:p>
+          <a:p>
+            <a:r>
+              <a:rPr lang="en-IN" sz="2000" dirty="0">
+                <a:latin typeface="Calibri" panose="020F0502020204030204" pitchFamily="34" charset="0"/>
+                <a:cs typeface="Calibri" panose="020F0502020204030204" pitchFamily="34" charset="0"/>
+              </a:rPr>
+              <a:t>after method call tt= Pune no=111</a:t>
             </a:r>
           </a:p>
         </p:txBody>
@@ -9964,10 +9801,148 @@
         </p:nvSpPr>
         <p:spPr/>
         <p:txBody>
-          <a:bodyPr/>
+          <a:bodyPr>
+            <a:normAutofit fontScale="77500" lnSpcReduction="20000"/>
+          </a:bodyPr>
           <a:lstStyle/>
           <a:p>
-            <a:endParaRPr lang="en-IN"/>
+            <a:pPr algn="l" fontAlgn="base"/>
+            <a:r>
+              <a:rPr lang="en-US" b="0" i="0" dirty="0">
+                <a:solidFill>
+                  <a:srgbClr val="273239"/>
+                </a:solidFill>
+                <a:effectLst/>
+                <a:highlight>
+                  <a:srgbClr val="FFFFFF"/>
+                </a:highlight>
+                <a:latin typeface="Nunito" pitchFamily="2" charset="0"/>
+              </a:rPr>
+              <a:t>The ref is a keyword in C# </a:t>
+            </a:r>
+          </a:p>
+          <a:p>
+            <a:pPr algn="l" fontAlgn="base"/>
+            <a:r>
+              <a:rPr lang="en-US" b="0" i="0" dirty="0">
+                <a:solidFill>
+                  <a:srgbClr val="273239"/>
+                </a:solidFill>
+                <a:effectLst/>
+                <a:highlight>
+                  <a:srgbClr val="FFFFFF"/>
+                </a:highlight>
+                <a:latin typeface="Nunito" pitchFamily="2" charset="0"/>
+              </a:rPr>
+              <a:t>which is used for </a:t>
+            </a:r>
+            <a:r>
+              <a:rPr lang="en-US" b="1" i="0" dirty="0">
+                <a:solidFill>
+                  <a:srgbClr val="273239"/>
+                </a:solidFill>
+                <a:effectLst/>
+                <a:highlight>
+                  <a:srgbClr val="FFFFFF"/>
+                </a:highlight>
+                <a:latin typeface="Nunito" pitchFamily="2" charset="0"/>
+              </a:rPr>
+              <a:t>passing the value types by reference. </a:t>
+            </a:r>
+          </a:p>
+          <a:p>
+            <a:pPr algn="l" fontAlgn="base"/>
+            <a:r>
+              <a:rPr lang="en-US" b="0" i="0" dirty="0">
+                <a:solidFill>
+                  <a:srgbClr val="273239"/>
+                </a:solidFill>
+                <a:effectLst/>
+                <a:highlight>
+                  <a:srgbClr val="FFFFFF"/>
+                </a:highlight>
+                <a:latin typeface="Nunito" pitchFamily="2" charset="0"/>
+              </a:rPr>
+              <a:t>if any changes made in this argument in the method will reflect in that variable when the control return to the calling method. </a:t>
+            </a:r>
+          </a:p>
+          <a:p>
+            <a:pPr algn="l" fontAlgn="base"/>
+            <a:r>
+              <a:rPr lang="en-US" b="0" i="0" dirty="0">
+                <a:solidFill>
+                  <a:srgbClr val="273239"/>
+                </a:solidFill>
+                <a:effectLst/>
+                <a:highlight>
+                  <a:srgbClr val="FFFFFF"/>
+                </a:highlight>
+                <a:latin typeface="Nunito" pitchFamily="2" charset="0"/>
+              </a:rPr>
+              <a:t>The ref parameter </a:t>
+            </a:r>
+            <a:r>
+              <a:rPr lang="en-US" b="1" i="0" dirty="0">
+                <a:solidFill>
+                  <a:srgbClr val="273239"/>
+                </a:solidFill>
+                <a:effectLst/>
+                <a:highlight>
+                  <a:srgbClr val="FFFFFF"/>
+                </a:highlight>
+                <a:latin typeface="Nunito" pitchFamily="2" charset="0"/>
+              </a:rPr>
+              <a:t>does not pass the property. </a:t>
+            </a:r>
+          </a:p>
+          <a:p>
+            <a:pPr algn="l" fontAlgn="base"/>
+            <a:r>
+              <a:rPr lang="en-US" b="0" i="0" dirty="0">
+                <a:solidFill>
+                  <a:srgbClr val="273239"/>
+                </a:solidFill>
+                <a:effectLst/>
+                <a:highlight>
+                  <a:srgbClr val="FFFFFF"/>
+                </a:highlight>
+                <a:latin typeface="Nunito" pitchFamily="2" charset="0"/>
+              </a:rPr>
+              <a:t>In ref parameters, it is </a:t>
+            </a:r>
+            <a:r>
+              <a:rPr lang="en-US" b="1" i="0" dirty="0">
+                <a:solidFill>
+                  <a:srgbClr val="273239"/>
+                </a:solidFill>
+                <a:effectLst/>
+                <a:highlight>
+                  <a:srgbClr val="FFFFFF"/>
+                </a:highlight>
+                <a:latin typeface="Nunito" pitchFamily="2" charset="0"/>
+              </a:rPr>
+              <a:t>necessary that the parameters should initialize before it pass to ref. </a:t>
+            </a:r>
+          </a:p>
+          <a:p>
+            <a:pPr algn="l" fontAlgn="base"/>
+            <a:r>
+              <a:rPr lang="en-US" b="0" i="0" dirty="0">
+                <a:solidFill>
+                  <a:srgbClr val="273239"/>
+                </a:solidFill>
+                <a:effectLst/>
+                <a:highlight>
+                  <a:srgbClr val="FFFFFF"/>
+                </a:highlight>
+                <a:latin typeface="Nunito" pitchFamily="2" charset="0"/>
+              </a:rPr>
+              <a:t>The passing of value through the ref parameter is useful when the called method also needs to change the value of the passed parameter.</a:t>
+            </a:r>
+            <a:br>
+              <a:rPr lang="en-US" dirty="0"/>
+            </a:br>
+            <a:endParaRPr lang="en-IN" dirty="0"/>
           </a:p>
         </p:txBody>
       </p:sp>
@@ -9985,6 +9960,2705 @@
 </file>
 
 <file path=ppt/slides/slide28.xml><?xml version="1.0" encoding="utf-8"?>
+<p:sld xmlns:a="http://schemas.openxmlformats.org/drawingml/2006/main" xmlns:r="http://schemas.openxmlformats.org/officeDocument/2006/relationships" xmlns:p="http://schemas.openxmlformats.org/presentationml/2006/main">
+  <p:cSld>
+    <p:spTree>
+      <p:nvGrpSpPr>
+        <p:cNvPr id="1" name=""/>
+        <p:cNvGrpSpPr/>
+        <p:nvPr/>
+      </p:nvGrpSpPr>
+      <p:grpSpPr>
+        <a:xfrm>
+          <a:off x="0" y="0"/>
+          <a:ext cx="0" cy="0"/>
+          <a:chOff x="0" y="0"/>
+          <a:chExt cx="0" cy="0"/>
+        </a:xfrm>
+      </p:grpSpPr>
+      <p:sp>
+        <p:nvSpPr>
+          <p:cNvPr id="4" name="TextBox 3">
+            <a:extLst>
+              <a:ext uri="{FF2B5EF4-FFF2-40B4-BE49-F238E27FC236}">
+                <a16:creationId xmlns:a16="http://schemas.microsoft.com/office/drawing/2014/main" id="{77C1ED4C-4DE8-6A99-94BB-0B750E5D60F6}"/>
+              </a:ext>
+            </a:extLst>
+          </p:cNvPr>
+          <p:cNvSpPr txBox="1"/>
+          <p:nvPr/>
+        </p:nvSpPr>
+        <p:spPr>
+          <a:xfrm>
+            <a:off x="1524000" y="9163"/>
+            <a:ext cx="4114800" cy="3139321"/>
+          </a:xfrm>
+          <a:prstGeom prst="rect">
+            <a:avLst/>
+          </a:prstGeom>
+          <a:solidFill>
+            <a:schemeClr val="accent2">
+              <a:lumMod val="40000"/>
+              <a:lumOff val="60000"/>
+            </a:schemeClr>
+          </a:solidFill>
+        </p:spPr>
+        <p:txBody>
+          <a:bodyPr wrap="square" rtlCol="0">
+            <a:spAutoFit/>
+          </a:bodyPr>
+          <a:lstStyle/>
+          <a:p>
+            <a:r>
+              <a:rPr lang="en-IN" dirty="0">
+                <a:latin typeface="Calibri" panose="020F0502020204030204" pitchFamily="34" charset="0"/>
+                <a:cs typeface="Calibri" panose="020F0502020204030204" pitchFamily="34" charset="0"/>
+              </a:rPr>
+              <a:t>class numbers</a:t>
+            </a:r>
+          </a:p>
+          <a:p>
+            <a:r>
+              <a:rPr lang="en-IN" dirty="0">
+                <a:latin typeface="Calibri" panose="020F0502020204030204" pitchFamily="34" charset="0"/>
+                <a:cs typeface="Calibri" panose="020F0502020204030204" pitchFamily="34" charset="0"/>
+              </a:rPr>
+              <a:t>{</a:t>
+            </a:r>
+          </a:p>
+          <a:p>
+            <a:r>
+              <a:rPr lang="en-IN" dirty="0">
+                <a:latin typeface="Calibri" panose="020F0502020204030204" pitchFamily="34" charset="0"/>
+                <a:cs typeface="Calibri" panose="020F0502020204030204" pitchFamily="34" charset="0"/>
+              </a:rPr>
+              <a:t>    public void swap(ref int x, ref int y)</a:t>
+            </a:r>
+          </a:p>
+          <a:p>
+            <a:r>
+              <a:rPr lang="en-IN" dirty="0">
+                <a:latin typeface="Calibri" panose="020F0502020204030204" pitchFamily="34" charset="0"/>
+                <a:cs typeface="Calibri" panose="020F0502020204030204" pitchFamily="34" charset="0"/>
+              </a:rPr>
+              <a:t>          {</a:t>
+            </a:r>
+          </a:p>
+          <a:p>
+            <a:r>
+              <a:rPr lang="en-IN" dirty="0">
+                <a:latin typeface="Calibri" panose="020F0502020204030204" pitchFamily="34" charset="0"/>
+                <a:cs typeface="Calibri" panose="020F0502020204030204" pitchFamily="34" charset="0"/>
+              </a:rPr>
+              <a:t>              int temp;</a:t>
+            </a:r>
+          </a:p>
+          <a:p>
+            <a:r>
+              <a:rPr lang="en-IN" dirty="0">
+                <a:latin typeface="Calibri" panose="020F0502020204030204" pitchFamily="34" charset="0"/>
+                <a:cs typeface="Calibri" panose="020F0502020204030204" pitchFamily="34" charset="0"/>
+              </a:rPr>
+              <a:t>                temp=x;</a:t>
+            </a:r>
+          </a:p>
+          <a:p>
+            <a:r>
+              <a:rPr lang="en-IN" dirty="0">
+                <a:latin typeface="Calibri" panose="020F0502020204030204" pitchFamily="34" charset="0"/>
+                <a:cs typeface="Calibri" panose="020F0502020204030204" pitchFamily="34" charset="0"/>
+              </a:rPr>
+              <a:t>                x=y;</a:t>
+            </a:r>
+          </a:p>
+          <a:p>
+            <a:r>
+              <a:rPr lang="en-IN" dirty="0">
+                <a:latin typeface="Calibri" panose="020F0502020204030204" pitchFamily="34" charset="0"/>
+                <a:cs typeface="Calibri" panose="020F0502020204030204" pitchFamily="34" charset="0"/>
+              </a:rPr>
+              <a:t>                y=temp;</a:t>
+            </a:r>
+          </a:p>
+          <a:p>
+            <a:r>
+              <a:rPr lang="en-IN" dirty="0">
+                <a:latin typeface="Calibri" panose="020F0502020204030204" pitchFamily="34" charset="0"/>
+                <a:cs typeface="Calibri" panose="020F0502020204030204" pitchFamily="34" charset="0"/>
+              </a:rPr>
+              <a:t>          }</a:t>
+            </a:r>
+          </a:p>
+          <a:p>
+            <a:r>
+              <a:rPr lang="en-IN" dirty="0">
+                <a:latin typeface="Calibri" panose="020F0502020204030204" pitchFamily="34" charset="0"/>
+                <a:cs typeface="Calibri" panose="020F0502020204030204" pitchFamily="34" charset="0"/>
+              </a:rPr>
+              <a:t>}</a:t>
+            </a:r>
+          </a:p>
+          <a:p>
+            <a:endParaRPr lang="en-IN" dirty="0">
+              <a:latin typeface="Calibri" panose="020F0502020204030204" pitchFamily="34" charset="0"/>
+              <a:cs typeface="Calibri" panose="020F0502020204030204" pitchFamily="34" charset="0"/>
+            </a:endParaRPr>
+          </a:p>
+        </p:txBody>
+      </p:sp>
+      <p:sp>
+        <p:nvSpPr>
+          <p:cNvPr id="6" name="TextBox 5">
+            <a:extLst>
+              <a:ext uri="{FF2B5EF4-FFF2-40B4-BE49-F238E27FC236}">
+                <a16:creationId xmlns:a16="http://schemas.microsoft.com/office/drawing/2014/main" id="{B77EFD38-154E-5A9D-2046-C4061C64626B}"/>
+              </a:ext>
+            </a:extLst>
+          </p:cNvPr>
+          <p:cNvSpPr txBox="1"/>
+          <p:nvPr/>
+        </p:nvSpPr>
+        <p:spPr>
+          <a:xfrm>
+            <a:off x="4648200" y="1149340"/>
+            <a:ext cx="5949386" cy="3416320"/>
+          </a:xfrm>
+          <a:prstGeom prst="rect">
+            <a:avLst/>
+          </a:prstGeom>
+          <a:solidFill>
+            <a:schemeClr val="accent1">
+              <a:lumMod val="40000"/>
+              <a:lumOff val="60000"/>
+            </a:schemeClr>
+          </a:solidFill>
+        </p:spPr>
+        <p:txBody>
+          <a:bodyPr wrap="square">
+            <a:spAutoFit/>
+          </a:bodyPr>
+          <a:lstStyle/>
+          <a:p>
+            <a:r>
+              <a:rPr lang="en-IN" dirty="0">
+                <a:latin typeface="Calibri" panose="020F0502020204030204" pitchFamily="34" charset="0"/>
+                <a:cs typeface="Calibri" panose="020F0502020204030204" pitchFamily="34" charset="0"/>
+              </a:rPr>
+              <a:t>public class HelloWorld</a:t>
+            </a:r>
+          </a:p>
+          <a:p>
+            <a:r>
+              <a:rPr lang="en-IN" dirty="0">
+                <a:latin typeface="Calibri" panose="020F0502020204030204" pitchFamily="34" charset="0"/>
+                <a:cs typeface="Calibri" panose="020F0502020204030204" pitchFamily="34" charset="0"/>
+              </a:rPr>
+              <a:t>{</a:t>
+            </a:r>
+          </a:p>
+          <a:p>
+            <a:r>
+              <a:rPr lang="en-IN" dirty="0">
+                <a:latin typeface="Calibri" panose="020F0502020204030204" pitchFamily="34" charset="0"/>
+                <a:cs typeface="Calibri" panose="020F0502020204030204" pitchFamily="34" charset="0"/>
+              </a:rPr>
+              <a:t>    public static void Main(string[] </a:t>
+            </a:r>
+            <a:r>
+              <a:rPr lang="en-IN" dirty="0" err="1">
+                <a:latin typeface="Calibri" panose="020F0502020204030204" pitchFamily="34" charset="0"/>
+                <a:cs typeface="Calibri" panose="020F0502020204030204" pitchFamily="34" charset="0"/>
+              </a:rPr>
+              <a:t>args</a:t>
+            </a:r>
+            <a:r>
+              <a:rPr lang="en-IN" dirty="0">
+                <a:latin typeface="Calibri" panose="020F0502020204030204" pitchFamily="34" charset="0"/>
+                <a:cs typeface="Calibri" panose="020F0502020204030204" pitchFamily="34" charset="0"/>
+              </a:rPr>
+              <a:t>)</a:t>
+            </a:r>
+          </a:p>
+          <a:p>
+            <a:r>
+              <a:rPr lang="en-IN" dirty="0">
+                <a:latin typeface="Calibri" panose="020F0502020204030204" pitchFamily="34" charset="0"/>
+                <a:cs typeface="Calibri" panose="020F0502020204030204" pitchFamily="34" charset="0"/>
+              </a:rPr>
+              <a:t>    {</a:t>
+            </a:r>
+          </a:p>
+          <a:p>
+            <a:r>
+              <a:rPr lang="en-IN" dirty="0">
+                <a:latin typeface="Calibri" panose="020F0502020204030204" pitchFamily="34" charset="0"/>
+                <a:cs typeface="Calibri" panose="020F0502020204030204" pitchFamily="34" charset="0"/>
+              </a:rPr>
+              <a:t>        int a=10;</a:t>
+            </a:r>
+          </a:p>
+          <a:p>
+            <a:r>
+              <a:rPr lang="en-IN" dirty="0">
+                <a:latin typeface="Calibri" panose="020F0502020204030204" pitchFamily="34" charset="0"/>
+                <a:cs typeface="Calibri" panose="020F0502020204030204" pitchFamily="34" charset="0"/>
+              </a:rPr>
+              <a:t>        int b=20;</a:t>
+            </a:r>
+          </a:p>
+          <a:p>
+            <a:r>
+              <a:rPr lang="en-IN" dirty="0">
+                <a:latin typeface="Calibri" panose="020F0502020204030204" pitchFamily="34" charset="0"/>
+                <a:cs typeface="Calibri" panose="020F0502020204030204" pitchFamily="34" charset="0"/>
+              </a:rPr>
+              <a:t>        Console.WriteLine("Before swap a="+a+" b="+b);</a:t>
+            </a:r>
+          </a:p>
+          <a:p>
+            <a:r>
+              <a:rPr lang="en-IN" dirty="0">
+                <a:latin typeface="Calibri" panose="020F0502020204030204" pitchFamily="34" charset="0"/>
+                <a:cs typeface="Calibri" panose="020F0502020204030204" pitchFamily="34" charset="0"/>
+              </a:rPr>
+              <a:t>        numbers </a:t>
+            </a:r>
+            <a:r>
+              <a:rPr lang="en-IN" dirty="0" err="1">
+                <a:latin typeface="Calibri" panose="020F0502020204030204" pitchFamily="34" charset="0"/>
+                <a:cs typeface="Calibri" panose="020F0502020204030204" pitchFamily="34" charset="0"/>
+              </a:rPr>
+              <a:t>num</a:t>
+            </a:r>
+            <a:r>
+              <a:rPr lang="en-IN" dirty="0">
+                <a:latin typeface="Calibri" panose="020F0502020204030204" pitchFamily="34" charset="0"/>
+                <a:cs typeface="Calibri" panose="020F0502020204030204" pitchFamily="34" charset="0"/>
+              </a:rPr>
+              <a:t>=new numbers();</a:t>
+            </a:r>
+          </a:p>
+          <a:p>
+            <a:r>
+              <a:rPr lang="en-IN" dirty="0">
+                <a:latin typeface="Calibri" panose="020F0502020204030204" pitchFamily="34" charset="0"/>
+                <a:cs typeface="Calibri" panose="020F0502020204030204" pitchFamily="34" charset="0"/>
+              </a:rPr>
+              <a:t>        </a:t>
+            </a:r>
+            <a:r>
+              <a:rPr lang="en-IN" dirty="0" err="1">
+                <a:latin typeface="Calibri" panose="020F0502020204030204" pitchFamily="34" charset="0"/>
+                <a:cs typeface="Calibri" panose="020F0502020204030204" pitchFamily="34" charset="0"/>
+              </a:rPr>
+              <a:t>num.swap</a:t>
+            </a:r>
+            <a:r>
+              <a:rPr lang="en-IN" dirty="0">
+                <a:latin typeface="Calibri" panose="020F0502020204030204" pitchFamily="34" charset="0"/>
+                <a:cs typeface="Calibri" panose="020F0502020204030204" pitchFamily="34" charset="0"/>
+              </a:rPr>
+              <a:t>(ref </a:t>
+            </a:r>
+            <a:r>
+              <a:rPr lang="en-IN" dirty="0" err="1">
+                <a:latin typeface="Calibri" panose="020F0502020204030204" pitchFamily="34" charset="0"/>
+                <a:cs typeface="Calibri" panose="020F0502020204030204" pitchFamily="34" charset="0"/>
+              </a:rPr>
+              <a:t>a,ref</a:t>
+            </a:r>
+            <a:r>
+              <a:rPr lang="en-IN" dirty="0">
+                <a:latin typeface="Calibri" panose="020F0502020204030204" pitchFamily="34" charset="0"/>
+                <a:cs typeface="Calibri" panose="020F0502020204030204" pitchFamily="34" charset="0"/>
+              </a:rPr>
+              <a:t> b);</a:t>
+            </a:r>
+          </a:p>
+          <a:p>
+            <a:r>
+              <a:rPr lang="en-IN" dirty="0">
+                <a:latin typeface="Calibri" panose="020F0502020204030204" pitchFamily="34" charset="0"/>
+                <a:cs typeface="Calibri" panose="020F0502020204030204" pitchFamily="34" charset="0"/>
+              </a:rPr>
+              <a:t>        Console.WriteLine("After swap a="+a+" b="+b);</a:t>
+            </a:r>
+          </a:p>
+          <a:p>
+            <a:r>
+              <a:rPr lang="en-IN" dirty="0">
+                <a:latin typeface="Calibri" panose="020F0502020204030204" pitchFamily="34" charset="0"/>
+                <a:cs typeface="Calibri" panose="020F0502020204030204" pitchFamily="34" charset="0"/>
+              </a:rPr>
+              <a:t>    }</a:t>
+            </a:r>
+          </a:p>
+          <a:p>
+            <a:r>
+              <a:rPr lang="en-IN" dirty="0">
+                <a:latin typeface="Calibri" panose="020F0502020204030204" pitchFamily="34" charset="0"/>
+                <a:cs typeface="Calibri" panose="020F0502020204030204" pitchFamily="34" charset="0"/>
+              </a:rPr>
+              <a:t>}</a:t>
+            </a:r>
+          </a:p>
+        </p:txBody>
+      </p:sp>
+      <p:sp>
+        <p:nvSpPr>
+          <p:cNvPr id="8" name="TextBox 7">
+            <a:extLst>
+              <a:ext uri="{FF2B5EF4-FFF2-40B4-BE49-F238E27FC236}">
+                <a16:creationId xmlns:a16="http://schemas.microsoft.com/office/drawing/2014/main" id="{574DFE06-7959-8402-0FB1-7D86ADE45C00}"/>
+              </a:ext>
+            </a:extLst>
+          </p:cNvPr>
+          <p:cNvSpPr txBox="1"/>
+          <p:nvPr/>
+        </p:nvSpPr>
+        <p:spPr>
+          <a:xfrm>
+            <a:off x="1673507" y="4457700"/>
+            <a:ext cx="2669893" cy="923330"/>
+          </a:xfrm>
+          <a:prstGeom prst="rect">
+            <a:avLst/>
+          </a:prstGeom>
+          <a:solidFill>
+            <a:schemeClr val="accent5">
+              <a:lumMod val="40000"/>
+              <a:lumOff val="60000"/>
+            </a:schemeClr>
+          </a:solidFill>
+        </p:spPr>
+        <p:txBody>
+          <a:bodyPr wrap="square">
+            <a:spAutoFit/>
+          </a:bodyPr>
+          <a:lstStyle/>
+          <a:p>
+            <a:r>
+              <a:rPr lang="en-IN" b="1" dirty="0">
+                <a:latin typeface="Calibri" panose="020F0502020204030204" pitchFamily="34" charset="0"/>
+                <a:cs typeface="Calibri" panose="020F0502020204030204" pitchFamily="34" charset="0"/>
+              </a:rPr>
+              <a:t>OUTPUT</a:t>
+            </a:r>
+          </a:p>
+          <a:p>
+            <a:r>
+              <a:rPr lang="en-IN" dirty="0">
+                <a:latin typeface="Calibri" panose="020F0502020204030204" pitchFamily="34" charset="0"/>
+                <a:cs typeface="Calibri" panose="020F0502020204030204" pitchFamily="34" charset="0"/>
+              </a:rPr>
+              <a:t>Before swap a=10 b=20</a:t>
+            </a:r>
+          </a:p>
+          <a:p>
+            <a:r>
+              <a:rPr lang="en-IN" dirty="0">
+                <a:latin typeface="Calibri" panose="020F0502020204030204" pitchFamily="34" charset="0"/>
+                <a:cs typeface="Calibri" panose="020F0502020204030204" pitchFamily="34" charset="0"/>
+              </a:rPr>
+              <a:t>After swap a=20 b=10</a:t>
+            </a:r>
+          </a:p>
+        </p:txBody>
+      </p:sp>
+    </p:spTree>
+    <p:extLst>
+      <p:ext uri="{BB962C8B-B14F-4D97-AF65-F5344CB8AC3E}">
+        <p14:creationId xmlns:p14="http://schemas.microsoft.com/office/powerpoint/2010/main" val="873818620"/>
+      </p:ext>
+    </p:extLst>
+  </p:cSld>
+  <p:clrMapOvr>
+    <a:masterClrMapping/>
+  </p:clrMapOvr>
+</p:sld>
+</file>
+
+<file path=ppt/slides/slide29.xml><?xml version="1.0" encoding="utf-8"?>
+<p:sld xmlns:a="http://schemas.openxmlformats.org/drawingml/2006/main" xmlns:r="http://schemas.openxmlformats.org/officeDocument/2006/relationships" xmlns:p="http://schemas.openxmlformats.org/presentationml/2006/main">
+  <p:cSld>
+    <p:spTree>
+      <p:nvGrpSpPr>
+        <p:cNvPr id="1" name=""/>
+        <p:cNvGrpSpPr/>
+        <p:nvPr/>
+      </p:nvGrpSpPr>
+      <p:grpSpPr>
+        <a:xfrm>
+          <a:off x="0" y="0"/>
+          <a:ext cx="0" cy="0"/>
+          <a:chOff x="0" y="0"/>
+          <a:chExt cx="0" cy="0"/>
+        </a:xfrm>
+      </p:grpSpPr>
+      <p:sp>
+        <p:nvSpPr>
+          <p:cNvPr id="2" name="Title 1">
+            <a:extLst>
+              <a:ext uri="{FF2B5EF4-FFF2-40B4-BE49-F238E27FC236}">
+                <a16:creationId xmlns:a16="http://schemas.microsoft.com/office/drawing/2014/main" id="{A64A04AB-97F8-4CF7-C1FF-76B9B8B99DF9}"/>
+              </a:ext>
+            </a:extLst>
+          </p:cNvPr>
+          <p:cNvSpPr>
+            <a:spLocks noGrp="1"/>
+          </p:cNvSpPr>
+          <p:nvPr>
+            <p:ph type="title"/>
+          </p:nvPr>
+        </p:nvSpPr>
+        <p:spPr/>
+        <p:txBody>
+          <a:bodyPr>
+            <a:normAutofit/>
+          </a:bodyPr>
+          <a:lstStyle/>
+          <a:p>
+            <a:r>
+              <a:rPr lang="en-IN" dirty="0"/>
+              <a:t>Out parameters</a:t>
+            </a:r>
+          </a:p>
+        </p:txBody>
+      </p:sp>
+      <p:sp>
+        <p:nvSpPr>
+          <p:cNvPr id="3" name="Content Placeholder 2">
+            <a:extLst>
+              <a:ext uri="{FF2B5EF4-FFF2-40B4-BE49-F238E27FC236}">
+                <a16:creationId xmlns:a16="http://schemas.microsoft.com/office/drawing/2014/main" id="{C568EC5F-E572-438F-E187-6D1906B4C6A5}"/>
+              </a:ext>
+            </a:extLst>
+          </p:cNvPr>
+          <p:cNvSpPr>
+            <a:spLocks noGrp="1"/>
+          </p:cNvSpPr>
+          <p:nvPr>
+            <p:ph idx="1"/>
+          </p:nvPr>
+        </p:nvSpPr>
+        <p:spPr/>
+        <p:txBody>
+          <a:bodyPr>
+            <a:normAutofit fontScale="85000" lnSpcReduction="10000"/>
+          </a:bodyPr>
+          <a:lstStyle/>
+          <a:p>
+            <a:r>
+              <a:rPr lang="en-US" b="0" i="0" dirty="0">
+                <a:solidFill>
+                  <a:srgbClr val="273239"/>
+                </a:solidFill>
+                <a:effectLst/>
+                <a:highlight>
+                  <a:srgbClr val="FFFFFF"/>
+                </a:highlight>
+                <a:latin typeface="Nunito" pitchFamily="2" charset="0"/>
+              </a:rPr>
+              <a:t>The out is a keyword in C# </a:t>
+            </a:r>
+          </a:p>
+          <a:p>
+            <a:r>
+              <a:rPr lang="en-US" b="0" i="0" dirty="0">
+                <a:solidFill>
+                  <a:srgbClr val="273239"/>
+                </a:solidFill>
+                <a:effectLst/>
+                <a:highlight>
+                  <a:srgbClr val="FFFFFF"/>
+                </a:highlight>
+                <a:latin typeface="Nunito" pitchFamily="2" charset="0"/>
+              </a:rPr>
+              <a:t>which is used for the passing the arguments to methods as a reference type. </a:t>
+            </a:r>
+          </a:p>
+          <a:p>
+            <a:r>
+              <a:rPr lang="en-US" b="0" i="0" dirty="0">
+                <a:solidFill>
+                  <a:srgbClr val="273239"/>
+                </a:solidFill>
+                <a:effectLst/>
+                <a:highlight>
+                  <a:srgbClr val="FFFFFF"/>
+                </a:highlight>
+                <a:latin typeface="Nunito" pitchFamily="2" charset="0"/>
+              </a:rPr>
+              <a:t>It is generally used when a method returns multiple values. </a:t>
+            </a:r>
+          </a:p>
+          <a:p>
+            <a:r>
+              <a:rPr lang="en-US" b="0" i="0" dirty="0">
+                <a:solidFill>
+                  <a:srgbClr val="273239"/>
+                </a:solidFill>
+                <a:effectLst/>
+                <a:highlight>
+                  <a:srgbClr val="FFFFFF"/>
+                </a:highlight>
+                <a:latin typeface="Nunito" pitchFamily="2" charset="0"/>
+              </a:rPr>
+              <a:t>The out parameter does not pass the property. </a:t>
+            </a:r>
+          </a:p>
+          <a:p>
+            <a:r>
+              <a:rPr lang="en-US" b="0" i="0" dirty="0">
+                <a:solidFill>
+                  <a:srgbClr val="273239"/>
+                </a:solidFill>
+                <a:effectLst/>
+                <a:highlight>
+                  <a:srgbClr val="FFFFFF"/>
+                </a:highlight>
+                <a:latin typeface="Nunito" pitchFamily="2" charset="0"/>
+              </a:rPr>
+              <a:t>It is not necessary to initialize parameters before it passes to out. </a:t>
+            </a:r>
+          </a:p>
+          <a:p>
+            <a:r>
+              <a:rPr lang="en-US" b="0" i="0" dirty="0">
+                <a:solidFill>
+                  <a:srgbClr val="273239"/>
+                </a:solidFill>
+                <a:effectLst/>
+                <a:highlight>
+                  <a:srgbClr val="FFFFFF"/>
+                </a:highlight>
+                <a:latin typeface="Nunito" pitchFamily="2" charset="0"/>
+              </a:rPr>
+              <a:t>The declaring of parameter throughout parameter is useful when a method returns multiple values.</a:t>
+            </a:r>
+            <a:endParaRPr lang="en-IN" dirty="0"/>
+          </a:p>
+        </p:txBody>
+      </p:sp>
+    </p:spTree>
+    <p:extLst>
+      <p:ext uri="{BB962C8B-B14F-4D97-AF65-F5344CB8AC3E}">
+        <p14:creationId xmlns:p14="http://schemas.microsoft.com/office/powerpoint/2010/main" val="1251864719"/>
+      </p:ext>
+    </p:extLst>
+  </p:cSld>
+  <p:clrMapOvr>
+    <a:masterClrMapping/>
+  </p:clrMapOvr>
+</p:sld>
+</file>
+
+<file path=ppt/slides/slide3.xml><?xml version="1.0" encoding="utf-8"?>
+<p:sld xmlns:a="http://schemas.openxmlformats.org/drawingml/2006/main" xmlns:r="http://schemas.openxmlformats.org/officeDocument/2006/relationships" xmlns:p="http://schemas.openxmlformats.org/presentationml/2006/main">
+  <p:cSld>
+    <p:spTree>
+      <p:nvGrpSpPr>
+        <p:cNvPr id="1" name=""/>
+        <p:cNvGrpSpPr/>
+        <p:nvPr/>
+      </p:nvGrpSpPr>
+      <p:grpSpPr>
+        <a:xfrm>
+          <a:off x="0" y="0"/>
+          <a:ext cx="0" cy="0"/>
+          <a:chOff x="0" y="0"/>
+          <a:chExt cx="0" cy="0"/>
+        </a:xfrm>
+      </p:grpSpPr>
+      <p:sp>
+        <p:nvSpPr>
+          <p:cNvPr id="2" name="Title 1"/>
+          <p:cNvSpPr>
+            <a:spLocks noGrp="1"/>
+          </p:cNvSpPr>
+          <p:nvPr>
+            <p:ph type="title"/>
+          </p:nvPr>
+        </p:nvSpPr>
+        <p:spPr>
+          <a:xfrm>
+            <a:off x="1866290" y="-114299"/>
+            <a:ext cx="9747504" cy="952500"/>
+          </a:xfrm>
+        </p:spPr>
+        <p:txBody>
+          <a:bodyPr>
+            <a:normAutofit/>
+          </a:bodyPr>
+          <a:lstStyle/>
+          <a:p>
+            <a:r>
+              <a:rPr lang="en-US" b="1" dirty="0"/>
+              <a:t>Features of C# Structures</a:t>
+            </a:r>
+            <a:endParaRPr lang="en-US" dirty="0"/>
+          </a:p>
+        </p:txBody>
+      </p:sp>
+      <p:sp>
+        <p:nvSpPr>
+          <p:cNvPr id="3" name="Content Placeholder 2"/>
+          <p:cNvSpPr>
+            <a:spLocks noGrp="1"/>
+          </p:cNvSpPr>
+          <p:nvPr>
+            <p:ph idx="1"/>
+          </p:nvPr>
+        </p:nvSpPr>
+        <p:spPr>
+          <a:xfrm>
+            <a:off x="1089660" y="571502"/>
+            <a:ext cx="10797540" cy="5143499"/>
+          </a:xfrm>
+        </p:spPr>
+        <p:txBody>
+          <a:bodyPr>
+            <a:normAutofit/>
+          </a:bodyPr>
+          <a:lstStyle/>
+          <a:p>
+            <a:r>
+              <a:rPr lang="en-US" sz="2800" dirty="0">
+                <a:latin typeface="Times New Roman" pitchFamily="18" charset="0"/>
+                <a:cs typeface="Times New Roman" pitchFamily="18" charset="0"/>
+              </a:rPr>
+              <a:t>can have methods, fields, indexers, properties, operator methods, and events</a:t>
+            </a:r>
+          </a:p>
+          <a:p>
+            <a:r>
+              <a:rPr lang="en-US" sz="2800" dirty="0">
+                <a:latin typeface="Times New Roman" pitchFamily="18" charset="0"/>
+                <a:cs typeface="Times New Roman" pitchFamily="18" charset="0"/>
+              </a:rPr>
+              <a:t>can have defined constructors(parameterized constructor only, but not destructors).</a:t>
+            </a:r>
+          </a:p>
+          <a:p>
+            <a:r>
+              <a:rPr lang="en-US" sz="2800" dirty="0">
+                <a:solidFill>
+                  <a:srgbClr val="FF0000"/>
+                </a:solidFill>
+                <a:latin typeface="Times New Roman" pitchFamily="18" charset="0"/>
+                <a:cs typeface="Times New Roman" pitchFamily="18" charset="0"/>
+              </a:rPr>
+              <a:t>cannot define a default constructor</a:t>
+            </a:r>
+            <a:r>
+              <a:rPr lang="en-US" sz="2800" dirty="0">
+                <a:latin typeface="Times New Roman" pitchFamily="18" charset="0"/>
+                <a:cs typeface="Times New Roman" pitchFamily="18" charset="0"/>
+              </a:rPr>
+              <a:t> for a structure.</a:t>
+            </a:r>
+          </a:p>
+          <a:p>
+            <a:r>
+              <a:rPr lang="en-US" sz="2800" dirty="0"/>
+              <a:t>structures </a:t>
+            </a:r>
+            <a:r>
+              <a:rPr lang="en-US" sz="2800" dirty="0">
+                <a:solidFill>
+                  <a:srgbClr val="FF0000"/>
+                </a:solidFill>
+              </a:rPr>
+              <a:t>cannot inherit </a:t>
+            </a:r>
+            <a:r>
+              <a:rPr lang="en-US" sz="2800" dirty="0"/>
+              <a:t>other structures or classes.</a:t>
+            </a:r>
+          </a:p>
+          <a:p>
+            <a:r>
+              <a:rPr lang="en-US" sz="2800" dirty="0"/>
+              <a:t>can implement one or more interfaces.</a:t>
+            </a:r>
+          </a:p>
+          <a:p>
+            <a:r>
+              <a:rPr lang="en-US" sz="2800" dirty="0"/>
+              <a:t>structure can be instantiated without using the New operator.</a:t>
+            </a:r>
+          </a:p>
+          <a:p>
+            <a:r>
+              <a:rPr lang="en-US" sz="2800" dirty="0"/>
+              <a:t>If the New operator is not used, the fields remain unassigned and the object cannot be used until all the fields are initialized.</a:t>
+            </a:r>
+            <a:endParaRPr lang="en-US" sz="2800" dirty="0">
+              <a:latin typeface="Times New Roman" pitchFamily="18" charset="0"/>
+              <a:cs typeface="Times New Roman" pitchFamily="18" charset="0"/>
+            </a:endParaRPr>
+          </a:p>
+        </p:txBody>
+      </p:sp>
+    </p:spTree>
+  </p:cSld>
+  <p:clrMapOvr>
+    <a:masterClrMapping/>
+  </p:clrMapOvr>
+</p:sld>
+</file>
+
+<file path=ppt/slides/slide30.xml><?xml version="1.0" encoding="utf-8"?>
+<p:sld xmlns:a="http://schemas.openxmlformats.org/drawingml/2006/main" xmlns:r="http://schemas.openxmlformats.org/officeDocument/2006/relationships" xmlns:p="http://schemas.openxmlformats.org/presentationml/2006/main">
+  <p:cSld>
+    <p:spTree>
+      <p:nvGrpSpPr>
+        <p:cNvPr id="1" name=""/>
+        <p:cNvGrpSpPr/>
+        <p:nvPr/>
+      </p:nvGrpSpPr>
+      <p:grpSpPr>
+        <a:xfrm>
+          <a:off x="0" y="0"/>
+          <a:ext cx="0" cy="0"/>
+          <a:chOff x="0" y="0"/>
+          <a:chExt cx="0" cy="0"/>
+        </a:xfrm>
+      </p:grpSpPr>
+      <p:sp>
+        <p:nvSpPr>
+          <p:cNvPr id="5" name="TextBox 4">
+            <a:extLst>
+              <a:ext uri="{FF2B5EF4-FFF2-40B4-BE49-F238E27FC236}">
+                <a16:creationId xmlns:a16="http://schemas.microsoft.com/office/drawing/2014/main" id="{6D4022F7-C129-90DE-13AB-B15EDA3E7A20}"/>
+              </a:ext>
+            </a:extLst>
+          </p:cNvPr>
+          <p:cNvSpPr txBox="1"/>
+          <p:nvPr/>
+        </p:nvSpPr>
+        <p:spPr>
+          <a:xfrm>
+            <a:off x="1371600" y="190500"/>
+            <a:ext cx="5949386" cy="3139321"/>
+          </a:xfrm>
+          <a:prstGeom prst="rect">
+            <a:avLst/>
+          </a:prstGeom>
+          <a:solidFill>
+            <a:schemeClr val="accent1">
+              <a:lumMod val="40000"/>
+              <a:lumOff val="60000"/>
+            </a:schemeClr>
+          </a:solidFill>
+        </p:spPr>
+        <p:txBody>
+          <a:bodyPr wrap="square">
+            <a:spAutoFit/>
+          </a:bodyPr>
+          <a:lstStyle/>
+          <a:p>
+            <a:r>
+              <a:rPr lang="en-IN" dirty="0">
+                <a:latin typeface="Calibri" panose="020F0502020204030204" pitchFamily="34" charset="0"/>
+                <a:cs typeface="Calibri" panose="020F0502020204030204" pitchFamily="34" charset="0"/>
+              </a:rPr>
+              <a:t>class numbers</a:t>
+            </a:r>
+          </a:p>
+          <a:p>
+            <a:r>
+              <a:rPr lang="en-IN" dirty="0">
+                <a:latin typeface="Calibri" panose="020F0502020204030204" pitchFamily="34" charset="0"/>
+                <a:cs typeface="Calibri" panose="020F0502020204030204" pitchFamily="34" charset="0"/>
+              </a:rPr>
+              <a:t>{</a:t>
+            </a:r>
+          </a:p>
+          <a:p>
+            <a:r>
+              <a:rPr lang="en-IN" dirty="0">
+                <a:latin typeface="Calibri" panose="020F0502020204030204" pitchFamily="34" charset="0"/>
+                <a:cs typeface="Calibri" panose="020F0502020204030204" pitchFamily="34" charset="0"/>
+              </a:rPr>
+              <a:t>      public float </a:t>
+            </a:r>
+            <a:r>
+              <a:rPr lang="en-IN" dirty="0" err="1">
+                <a:latin typeface="Calibri" panose="020F0502020204030204" pitchFamily="34" charset="0"/>
+                <a:cs typeface="Calibri" panose="020F0502020204030204" pitchFamily="34" charset="0"/>
+              </a:rPr>
+              <a:t>Area_perimeter</a:t>
+            </a:r>
+            <a:r>
+              <a:rPr lang="en-IN" dirty="0">
+                <a:latin typeface="Calibri" panose="020F0502020204030204" pitchFamily="34" charset="0"/>
+                <a:cs typeface="Calibri" panose="020F0502020204030204" pitchFamily="34" charset="0"/>
+              </a:rPr>
+              <a:t>(int r, out float per)</a:t>
+            </a:r>
+          </a:p>
+          <a:p>
+            <a:r>
+              <a:rPr lang="en-IN" dirty="0">
+                <a:latin typeface="Calibri" panose="020F0502020204030204" pitchFamily="34" charset="0"/>
+                <a:cs typeface="Calibri" panose="020F0502020204030204" pitchFamily="34" charset="0"/>
+              </a:rPr>
+              <a:t>      {</a:t>
+            </a:r>
+          </a:p>
+          <a:p>
+            <a:r>
+              <a:rPr lang="en-IN" dirty="0">
+                <a:latin typeface="Calibri" panose="020F0502020204030204" pitchFamily="34" charset="0"/>
+                <a:cs typeface="Calibri" panose="020F0502020204030204" pitchFamily="34" charset="0"/>
+              </a:rPr>
+              <a:t>           float area=3.14f*r*r;</a:t>
+            </a:r>
+          </a:p>
+          <a:p>
+            <a:r>
+              <a:rPr lang="en-IN" dirty="0">
+                <a:latin typeface="Calibri" panose="020F0502020204030204" pitchFamily="34" charset="0"/>
+                <a:cs typeface="Calibri" panose="020F0502020204030204" pitchFamily="34" charset="0"/>
+              </a:rPr>
+              <a:t>           per=2*3.14f*r;</a:t>
+            </a:r>
+          </a:p>
+          <a:p>
+            <a:r>
+              <a:rPr lang="en-IN" dirty="0">
+                <a:latin typeface="Calibri" panose="020F0502020204030204" pitchFamily="34" charset="0"/>
+                <a:cs typeface="Calibri" panose="020F0502020204030204" pitchFamily="34" charset="0"/>
+              </a:rPr>
+              <a:t>           return area;</a:t>
+            </a:r>
+          </a:p>
+          <a:p>
+            <a:r>
+              <a:rPr lang="en-IN" dirty="0">
+                <a:latin typeface="Calibri" panose="020F0502020204030204" pitchFamily="34" charset="0"/>
+                <a:cs typeface="Calibri" panose="020F0502020204030204" pitchFamily="34" charset="0"/>
+              </a:rPr>
+              <a:t>      }</a:t>
+            </a:r>
+          </a:p>
+          <a:p>
+            <a:r>
+              <a:rPr lang="en-IN" dirty="0">
+                <a:latin typeface="Calibri" panose="020F0502020204030204" pitchFamily="34" charset="0"/>
+                <a:cs typeface="Calibri" panose="020F0502020204030204" pitchFamily="34" charset="0"/>
+              </a:rPr>
+              <a:t>   </a:t>
+            </a:r>
+          </a:p>
+          <a:p>
+            <a:r>
+              <a:rPr lang="en-IN" dirty="0">
+                <a:latin typeface="Calibri" panose="020F0502020204030204" pitchFamily="34" charset="0"/>
+                <a:cs typeface="Calibri" panose="020F0502020204030204" pitchFamily="34" charset="0"/>
+              </a:rPr>
+              <a:t>}</a:t>
+            </a:r>
+          </a:p>
+          <a:p>
+            <a:endParaRPr lang="en-IN" dirty="0">
+              <a:latin typeface="Calibri" panose="020F0502020204030204" pitchFamily="34" charset="0"/>
+              <a:cs typeface="Calibri" panose="020F0502020204030204" pitchFamily="34" charset="0"/>
+            </a:endParaRPr>
+          </a:p>
+        </p:txBody>
+      </p:sp>
+      <p:sp>
+        <p:nvSpPr>
+          <p:cNvPr id="7" name="TextBox 6">
+            <a:extLst>
+              <a:ext uri="{FF2B5EF4-FFF2-40B4-BE49-F238E27FC236}">
+                <a16:creationId xmlns:a16="http://schemas.microsoft.com/office/drawing/2014/main" id="{D2D66FFC-0436-6BDD-5AB9-98FAB0A614AB}"/>
+              </a:ext>
+            </a:extLst>
+          </p:cNvPr>
+          <p:cNvSpPr txBox="1"/>
+          <p:nvPr/>
+        </p:nvSpPr>
+        <p:spPr>
+          <a:xfrm>
+            <a:off x="5105400" y="1257300"/>
+            <a:ext cx="5949386" cy="3693319"/>
+          </a:xfrm>
+          <a:prstGeom prst="rect">
+            <a:avLst/>
+          </a:prstGeom>
+          <a:solidFill>
+            <a:schemeClr val="accent2">
+              <a:lumMod val="40000"/>
+              <a:lumOff val="60000"/>
+            </a:schemeClr>
+          </a:solidFill>
+        </p:spPr>
+        <p:txBody>
+          <a:bodyPr wrap="square">
+            <a:spAutoFit/>
+          </a:bodyPr>
+          <a:lstStyle/>
+          <a:p>
+            <a:r>
+              <a:rPr lang="en-IN" dirty="0">
+                <a:latin typeface="Calibri" panose="020F0502020204030204" pitchFamily="34" charset="0"/>
+                <a:cs typeface="Calibri" panose="020F0502020204030204" pitchFamily="34" charset="0"/>
+              </a:rPr>
+              <a:t>public class HelloWorld</a:t>
+            </a:r>
+          </a:p>
+          <a:p>
+            <a:r>
+              <a:rPr lang="en-IN" dirty="0">
+                <a:latin typeface="Calibri" panose="020F0502020204030204" pitchFamily="34" charset="0"/>
+                <a:cs typeface="Calibri" panose="020F0502020204030204" pitchFamily="34" charset="0"/>
+              </a:rPr>
+              <a:t>{</a:t>
+            </a:r>
+          </a:p>
+          <a:p>
+            <a:r>
+              <a:rPr lang="en-IN" dirty="0">
+                <a:latin typeface="Calibri" panose="020F0502020204030204" pitchFamily="34" charset="0"/>
+                <a:cs typeface="Calibri" panose="020F0502020204030204" pitchFamily="34" charset="0"/>
+              </a:rPr>
+              <a:t>    public static void Main(string[] </a:t>
+            </a:r>
+            <a:r>
+              <a:rPr lang="en-IN" dirty="0" err="1">
+                <a:latin typeface="Calibri" panose="020F0502020204030204" pitchFamily="34" charset="0"/>
+                <a:cs typeface="Calibri" panose="020F0502020204030204" pitchFamily="34" charset="0"/>
+              </a:rPr>
+              <a:t>args</a:t>
+            </a:r>
+            <a:r>
+              <a:rPr lang="en-IN" dirty="0">
+                <a:latin typeface="Calibri" panose="020F0502020204030204" pitchFamily="34" charset="0"/>
+                <a:cs typeface="Calibri" panose="020F0502020204030204" pitchFamily="34" charset="0"/>
+              </a:rPr>
+              <a:t>)</a:t>
+            </a:r>
+          </a:p>
+          <a:p>
+            <a:r>
+              <a:rPr lang="en-IN" dirty="0">
+                <a:latin typeface="Calibri" panose="020F0502020204030204" pitchFamily="34" charset="0"/>
+                <a:cs typeface="Calibri" panose="020F0502020204030204" pitchFamily="34" charset="0"/>
+              </a:rPr>
+              <a:t>    {</a:t>
+            </a:r>
+          </a:p>
+          <a:p>
+            <a:r>
+              <a:rPr lang="en-IN" dirty="0">
+                <a:latin typeface="Calibri" panose="020F0502020204030204" pitchFamily="34" charset="0"/>
+                <a:cs typeface="Calibri" panose="020F0502020204030204" pitchFamily="34" charset="0"/>
+              </a:rPr>
+              <a:t>        int radius=20;</a:t>
+            </a:r>
+          </a:p>
+          <a:p>
+            <a:r>
+              <a:rPr lang="en-IN" dirty="0">
+                <a:latin typeface="Calibri" panose="020F0502020204030204" pitchFamily="34" charset="0"/>
+                <a:cs typeface="Calibri" panose="020F0502020204030204" pitchFamily="34" charset="0"/>
+              </a:rPr>
+              <a:t>        float </a:t>
+            </a:r>
+            <a:r>
+              <a:rPr lang="en-IN" dirty="0" err="1">
+                <a:latin typeface="Calibri" panose="020F0502020204030204" pitchFamily="34" charset="0"/>
+                <a:cs typeface="Calibri" panose="020F0502020204030204" pitchFamily="34" charset="0"/>
+              </a:rPr>
+              <a:t>ar</a:t>
+            </a:r>
+            <a:r>
+              <a:rPr lang="en-IN" dirty="0">
+                <a:latin typeface="Calibri" panose="020F0502020204030204" pitchFamily="34" charset="0"/>
+                <a:cs typeface="Calibri" panose="020F0502020204030204" pitchFamily="34" charset="0"/>
+              </a:rPr>
+              <a:t>;</a:t>
+            </a:r>
+          </a:p>
+          <a:p>
+            <a:r>
+              <a:rPr lang="en-IN" dirty="0">
+                <a:latin typeface="Calibri" panose="020F0502020204030204" pitchFamily="34" charset="0"/>
+                <a:cs typeface="Calibri" panose="020F0502020204030204" pitchFamily="34" charset="0"/>
+              </a:rPr>
+              <a:t>        float pr;</a:t>
+            </a:r>
+          </a:p>
+          <a:p>
+            <a:r>
+              <a:rPr lang="en-IN" dirty="0">
+                <a:latin typeface="Calibri" panose="020F0502020204030204" pitchFamily="34" charset="0"/>
+                <a:cs typeface="Calibri" panose="020F0502020204030204" pitchFamily="34" charset="0"/>
+              </a:rPr>
+              <a:t>        numbers </a:t>
+            </a:r>
+            <a:r>
+              <a:rPr lang="en-IN" dirty="0" err="1">
+                <a:latin typeface="Calibri" panose="020F0502020204030204" pitchFamily="34" charset="0"/>
+                <a:cs typeface="Calibri" panose="020F0502020204030204" pitchFamily="34" charset="0"/>
+              </a:rPr>
+              <a:t>num</a:t>
+            </a:r>
+            <a:r>
+              <a:rPr lang="en-IN" dirty="0">
+                <a:latin typeface="Calibri" panose="020F0502020204030204" pitchFamily="34" charset="0"/>
+                <a:cs typeface="Calibri" panose="020F0502020204030204" pitchFamily="34" charset="0"/>
+              </a:rPr>
+              <a:t>=new numbers();</a:t>
+            </a:r>
+          </a:p>
+          <a:p>
+            <a:r>
+              <a:rPr lang="en-IN" dirty="0">
+                <a:latin typeface="Calibri" panose="020F0502020204030204" pitchFamily="34" charset="0"/>
+                <a:cs typeface="Calibri" panose="020F0502020204030204" pitchFamily="34" charset="0"/>
+              </a:rPr>
+              <a:t>        </a:t>
+            </a:r>
+          </a:p>
+          <a:p>
+            <a:r>
+              <a:rPr lang="en-IN" dirty="0">
+                <a:latin typeface="Calibri" panose="020F0502020204030204" pitchFamily="34" charset="0"/>
+                <a:cs typeface="Calibri" panose="020F0502020204030204" pitchFamily="34" charset="0"/>
+              </a:rPr>
+              <a:t>        </a:t>
+            </a:r>
+            <a:r>
+              <a:rPr lang="en-IN" dirty="0" err="1">
+                <a:latin typeface="Calibri" panose="020F0502020204030204" pitchFamily="34" charset="0"/>
+                <a:cs typeface="Calibri" panose="020F0502020204030204" pitchFamily="34" charset="0"/>
+              </a:rPr>
+              <a:t>ar</a:t>
+            </a:r>
+            <a:r>
+              <a:rPr lang="en-IN" dirty="0">
+                <a:latin typeface="Calibri" panose="020F0502020204030204" pitchFamily="34" charset="0"/>
+                <a:cs typeface="Calibri" panose="020F0502020204030204" pitchFamily="34" charset="0"/>
+              </a:rPr>
+              <a:t>=</a:t>
+            </a:r>
+            <a:r>
+              <a:rPr lang="en-IN" dirty="0" err="1">
+                <a:latin typeface="Calibri" panose="020F0502020204030204" pitchFamily="34" charset="0"/>
+                <a:cs typeface="Calibri" panose="020F0502020204030204" pitchFamily="34" charset="0"/>
+              </a:rPr>
+              <a:t>num.Area_perimeter</a:t>
+            </a:r>
+            <a:r>
+              <a:rPr lang="en-IN" dirty="0">
+                <a:latin typeface="Calibri" panose="020F0502020204030204" pitchFamily="34" charset="0"/>
+                <a:cs typeface="Calibri" panose="020F0502020204030204" pitchFamily="34" charset="0"/>
+              </a:rPr>
+              <a:t>(</a:t>
+            </a:r>
+            <a:r>
+              <a:rPr lang="en-IN" dirty="0" err="1">
+                <a:latin typeface="Calibri" panose="020F0502020204030204" pitchFamily="34" charset="0"/>
+                <a:cs typeface="Calibri" panose="020F0502020204030204" pitchFamily="34" charset="0"/>
+              </a:rPr>
+              <a:t>radius,out</a:t>
+            </a:r>
+            <a:r>
+              <a:rPr lang="en-IN" dirty="0">
+                <a:latin typeface="Calibri" panose="020F0502020204030204" pitchFamily="34" charset="0"/>
+                <a:cs typeface="Calibri" panose="020F0502020204030204" pitchFamily="34" charset="0"/>
+              </a:rPr>
+              <a:t> pr);</a:t>
+            </a:r>
+          </a:p>
+          <a:p>
+            <a:r>
+              <a:rPr lang="en-IN" dirty="0">
+                <a:latin typeface="Calibri" panose="020F0502020204030204" pitchFamily="34" charset="0"/>
+                <a:cs typeface="Calibri" panose="020F0502020204030204" pitchFamily="34" charset="0"/>
+              </a:rPr>
+              <a:t>        Console.WriteLine("Area ="+</a:t>
+            </a:r>
+            <a:r>
+              <a:rPr lang="en-IN" dirty="0" err="1">
+                <a:latin typeface="Calibri" panose="020F0502020204030204" pitchFamily="34" charset="0"/>
+                <a:cs typeface="Calibri" panose="020F0502020204030204" pitchFamily="34" charset="0"/>
+              </a:rPr>
+              <a:t>ar</a:t>
+            </a:r>
+            <a:r>
+              <a:rPr lang="en-IN" dirty="0">
+                <a:latin typeface="Calibri" panose="020F0502020204030204" pitchFamily="34" charset="0"/>
+                <a:cs typeface="Calibri" panose="020F0502020204030204" pitchFamily="34" charset="0"/>
+              </a:rPr>
+              <a:t>+" Perimeter ="+pr);</a:t>
+            </a:r>
+          </a:p>
+          <a:p>
+            <a:r>
+              <a:rPr lang="en-IN" dirty="0">
+                <a:latin typeface="Calibri" panose="020F0502020204030204" pitchFamily="34" charset="0"/>
+                <a:cs typeface="Calibri" panose="020F0502020204030204" pitchFamily="34" charset="0"/>
+              </a:rPr>
+              <a:t>    }</a:t>
+            </a:r>
+          </a:p>
+          <a:p>
+            <a:r>
+              <a:rPr lang="en-IN" dirty="0">
+                <a:latin typeface="Calibri" panose="020F0502020204030204" pitchFamily="34" charset="0"/>
+                <a:cs typeface="Calibri" panose="020F0502020204030204" pitchFamily="34" charset="0"/>
+              </a:rPr>
+              <a:t>}</a:t>
+            </a:r>
+            <a:endParaRPr lang="en-IN" dirty="0"/>
+          </a:p>
+        </p:txBody>
+      </p:sp>
+      <p:sp>
+        <p:nvSpPr>
+          <p:cNvPr id="9" name="TextBox 8">
+            <a:extLst>
+              <a:ext uri="{FF2B5EF4-FFF2-40B4-BE49-F238E27FC236}">
+                <a16:creationId xmlns:a16="http://schemas.microsoft.com/office/drawing/2014/main" id="{CD8DA1CD-6A35-6599-F4E8-9C123C34FAD8}"/>
+              </a:ext>
+            </a:extLst>
+          </p:cNvPr>
+          <p:cNvSpPr txBox="1"/>
+          <p:nvPr/>
+        </p:nvSpPr>
+        <p:spPr>
+          <a:xfrm>
+            <a:off x="1524000" y="4838700"/>
+            <a:ext cx="3352800" cy="707886"/>
+          </a:xfrm>
+          <a:prstGeom prst="rect">
+            <a:avLst/>
+          </a:prstGeom>
+          <a:solidFill>
+            <a:schemeClr val="tx2">
+              <a:lumMod val="40000"/>
+              <a:lumOff val="60000"/>
+            </a:schemeClr>
+          </a:solidFill>
+        </p:spPr>
+        <p:txBody>
+          <a:bodyPr wrap="square">
+            <a:spAutoFit/>
+          </a:bodyPr>
+          <a:lstStyle/>
+          <a:p>
+            <a:r>
+              <a:rPr lang="en-IN" sz="2000" b="1" dirty="0">
+                <a:latin typeface="Calibri" panose="020F0502020204030204" pitchFamily="34" charset="0"/>
+                <a:cs typeface="Calibri" panose="020F0502020204030204" pitchFamily="34" charset="0"/>
+              </a:rPr>
+              <a:t>OUTPUT</a:t>
+            </a:r>
+          </a:p>
+          <a:p>
+            <a:r>
+              <a:rPr lang="en-IN" sz="2000" dirty="0">
+                <a:latin typeface="Calibri" panose="020F0502020204030204" pitchFamily="34" charset="0"/>
+                <a:cs typeface="Calibri" panose="020F0502020204030204" pitchFamily="34" charset="0"/>
+              </a:rPr>
+              <a:t>Area =1256 Perimeter =125.6</a:t>
+            </a:r>
+          </a:p>
+        </p:txBody>
+      </p:sp>
+    </p:spTree>
+    <p:extLst>
+      <p:ext uri="{BB962C8B-B14F-4D97-AF65-F5344CB8AC3E}">
+        <p14:creationId xmlns:p14="http://schemas.microsoft.com/office/powerpoint/2010/main" val="573305743"/>
+      </p:ext>
+    </p:extLst>
+  </p:cSld>
+  <p:clrMapOvr>
+    <a:masterClrMapping/>
+  </p:clrMapOvr>
+</p:sld>
+</file>
+
+<file path=ppt/slides/slide31.xml><?xml version="1.0" encoding="utf-8"?>
+<p:sld xmlns:a="http://schemas.openxmlformats.org/drawingml/2006/main" xmlns:r="http://schemas.openxmlformats.org/officeDocument/2006/relationships" xmlns:p="http://schemas.openxmlformats.org/presentationml/2006/main">
+  <p:cSld>
+    <p:spTree>
+      <p:nvGrpSpPr>
+        <p:cNvPr id="1" name=""/>
+        <p:cNvGrpSpPr/>
+        <p:nvPr/>
+      </p:nvGrpSpPr>
+      <p:grpSpPr>
+        <a:xfrm>
+          <a:off x="0" y="0"/>
+          <a:ext cx="0" cy="0"/>
+          <a:chOff x="0" y="0"/>
+          <a:chExt cx="0" cy="0"/>
+        </a:xfrm>
+      </p:grpSpPr>
+      <p:sp>
+        <p:nvSpPr>
+          <p:cNvPr id="2" name="Title 1">
+            <a:extLst>
+              <a:ext uri="{FF2B5EF4-FFF2-40B4-BE49-F238E27FC236}">
+                <a16:creationId xmlns:a16="http://schemas.microsoft.com/office/drawing/2014/main" id="{EC1748EC-F267-3B2D-86F5-97282EEB2A40}"/>
+              </a:ext>
+            </a:extLst>
+          </p:cNvPr>
+          <p:cNvSpPr>
+            <a:spLocks noGrp="1"/>
+          </p:cNvSpPr>
+          <p:nvPr>
+            <p:ph type="title"/>
+          </p:nvPr>
+        </p:nvSpPr>
+        <p:spPr/>
+        <p:txBody>
+          <a:bodyPr>
+            <a:normAutofit fontScale="90000"/>
+          </a:bodyPr>
+          <a:lstStyle/>
+          <a:p>
+            <a:r>
+              <a:rPr lang="en-IN" dirty="0"/>
+              <a:t>In parameters</a:t>
+            </a:r>
+            <a:br>
+              <a:rPr lang="en-IN" dirty="0"/>
+            </a:br>
+            <a:endParaRPr lang="en-IN" dirty="0"/>
+          </a:p>
+        </p:txBody>
+      </p:sp>
+      <p:sp>
+        <p:nvSpPr>
+          <p:cNvPr id="3" name="Content Placeholder 2">
+            <a:extLst>
+              <a:ext uri="{FF2B5EF4-FFF2-40B4-BE49-F238E27FC236}">
+                <a16:creationId xmlns:a16="http://schemas.microsoft.com/office/drawing/2014/main" id="{E03FFA2D-73C0-17AE-CA66-B3E7FFE0900A}"/>
+              </a:ext>
+            </a:extLst>
+          </p:cNvPr>
+          <p:cNvSpPr>
+            <a:spLocks noGrp="1"/>
+          </p:cNvSpPr>
+          <p:nvPr>
+            <p:ph idx="1"/>
+          </p:nvPr>
+        </p:nvSpPr>
+        <p:spPr/>
+        <p:txBody>
+          <a:bodyPr/>
+          <a:lstStyle/>
+          <a:p>
+            <a:r>
+              <a:rPr lang="en-US" b="1" i="0" dirty="0">
+                <a:solidFill>
+                  <a:srgbClr val="000000"/>
+                </a:solidFill>
+                <a:effectLst/>
+                <a:highlight>
+                  <a:srgbClr val="FFFFFF"/>
+                </a:highlight>
+                <a:latin typeface="PS Commons"/>
+              </a:rPr>
+              <a:t>in</a:t>
+            </a:r>
+            <a:r>
+              <a:rPr lang="en-US" b="0" i="0" dirty="0">
+                <a:solidFill>
+                  <a:srgbClr val="000000"/>
+                </a:solidFill>
+                <a:effectLst/>
+                <a:highlight>
+                  <a:srgbClr val="FFFFFF"/>
+                </a:highlight>
+                <a:latin typeface="PS Commons"/>
+              </a:rPr>
+              <a:t> is used to state that the parameter passed </a:t>
+            </a:r>
+            <a:r>
+              <a:rPr lang="en-US" b="0" i="1" dirty="0">
+                <a:solidFill>
+                  <a:srgbClr val="000000"/>
+                </a:solidFill>
+                <a:effectLst/>
+                <a:highlight>
+                  <a:srgbClr val="FFFFFF"/>
+                </a:highlight>
+                <a:latin typeface="PS Commons"/>
+              </a:rPr>
+              <a:t>cannot</a:t>
+            </a:r>
+            <a:r>
+              <a:rPr lang="en-US" b="0" i="0" dirty="0">
+                <a:solidFill>
+                  <a:srgbClr val="000000"/>
+                </a:solidFill>
+                <a:effectLst/>
+                <a:highlight>
+                  <a:srgbClr val="FFFFFF"/>
+                </a:highlight>
+                <a:latin typeface="PS Commons"/>
+              </a:rPr>
+              <a:t> be modified by the method.</a:t>
+            </a:r>
+          </a:p>
+          <a:p>
+            <a:endParaRPr lang="en-IN" dirty="0"/>
+          </a:p>
+        </p:txBody>
+      </p:sp>
+    </p:spTree>
+    <p:extLst>
+      <p:ext uri="{BB962C8B-B14F-4D97-AF65-F5344CB8AC3E}">
+        <p14:creationId xmlns:p14="http://schemas.microsoft.com/office/powerpoint/2010/main" val="2331858330"/>
+      </p:ext>
+    </p:extLst>
+  </p:cSld>
+  <p:clrMapOvr>
+    <a:masterClrMapping/>
+  </p:clrMapOvr>
+</p:sld>
+</file>
+
+<file path=ppt/slides/slide32.xml><?xml version="1.0" encoding="utf-8"?>
+<p:sld xmlns:a="http://schemas.openxmlformats.org/drawingml/2006/main" xmlns:r="http://schemas.openxmlformats.org/officeDocument/2006/relationships" xmlns:p="http://schemas.openxmlformats.org/presentationml/2006/main">
+  <p:cSld>
+    <p:spTree>
+      <p:nvGrpSpPr>
+        <p:cNvPr id="1" name=""/>
+        <p:cNvGrpSpPr/>
+        <p:nvPr/>
+      </p:nvGrpSpPr>
+      <p:grpSpPr>
+        <a:xfrm>
+          <a:off x="0" y="0"/>
+          <a:ext cx="0" cy="0"/>
+          <a:chOff x="0" y="0"/>
+          <a:chExt cx="0" cy="0"/>
+        </a:xfrm>
+      </p:grpSpPr>
+      <p:sp>
+        <p:nvSpPr>
+          <p:cNvPr id="5" name="TextBox 4">
+            <a:extLst>
+              <a:ext uri="{FF2B5EF4-FFF2-40B4-BE49-F238E27FC236}">
+                <a16:creationId xmlns:a16="http://schemas.microsoft.com/office/drawing/2014/main" id="{BA5053A2-406D-43FF-B30A-26830087271E}"/>
+              </a:ext>
+            </a:extLst>
+          </p:cNvPr>
+          <p:cNvSpPr txBox="1"/>
+          <p:nvPr/>
+        </p:nvSpPr>
+        <p:spPr>
+          <a:xfrm>
+            <a:off x="1295400" y="190500"/>
+            <a:ext cx="5949386" cy="2862322"/>
+          </a:xfrm>
+          <a:prstGeom prst="rect">
+            <a:avLst/>
+          </a:prstGeom>
+          <a:solidFill>
+            <a:schemeClr val="accent1">
+              <a:lumMod val="40000"/>
+              <a:lumOff val="60000"/>
+            </a:schemeClr>
+          </a:solidFill>
+        </p:spPr>
+        <p:txBody>
+          <a:bodyPr wrap="square">
+            <a:spAutoFit/>
+          </a:bodyPr>
+          <a:lstStyle/>
+          <a:p>
+            <a:r>
+              <a:rPr lang="en-IN" dirty="0">
+                <a:latin typeface="Calibri" panose="020F0502020204030204" pitchFamily="34" charset="0"/>
+                <a:cs typeface="Calibri" panose="020F0502020204030204" pitchFamily="34" charset="0"/>
+              </a:rPr>
+              <a:t>class </a:t>
+            </a:r>
+            <a:r>
+              <a:rPr lang="en-IN" dirty="0" err="1">
+                <a:latin typeface="Calibri" panose="020F0502020204030204" pitchFamily="34" charset="0"/>
+                <a:cs typeface="Calibri" panose="020F0502020204030204" pitchFamily="34" charset="0"/>
+              </a:rPr>
+              <a:t>MyClass</a:t>
+            </a:r>
+            <a:endParaRPr lang="en-IN" dirty="0">
+              <a:latin typeface="Calibri" panose="020F0502020204030204" pitchFamily="34" charset="0"/>
+              <a:cs typeface="Calibri" panose="020F0502020204030204" pitchFamily="34" charset="0"/>
+            </a:endParaRPr>
+          </a:p>
+          <a:p>
+            <a:r>
+              <a:rPr lang="en-IN" dirty="0">
+                <a:latin typeface="Calibri" panose="020F0502020204030204" pitchFamily="34" charset="0"/>
+                <a:cs typeface="Calibri" panose="020F0502020204030204" pitchFamily="34" charset="0"/>
+              </a:rPr>
+              <a:t>{</a:t>
+            </a:r>
+          </a:p>
+          <a:p>
+            <a:r>
+              <a:rPr lang="en-IN" dirty="0">
+                <a:latin typeface="Calibri" panose="020F0502020204030204" pitchFamily="34" charset="0"/>
+                <a:cs typeface="Calibri" panose="020F0502020204030204" pitchFamily="34" charset="0"/>
+              </a:rPr>
+              <a:t>      public void </a:t>
+            </a:r>
+            <a:r>
+              <a:rPr lang="en-IN" dirty="0" err="1">
+                <a:latin typeface="Calibri" panose="020F0502020204030204" pitchFamily="34" charset="0"/>
+                <a:cs typeface="Calibri" panose="020F0502020204030204" pitchFamily="34" charset="0"/>
+              </a:rPr>
+              <a:t>inDemo</a:t>
+            </a:r>
+            <a:r>
+              <a:rPr lang="en-IN" dirty="0">
+                <a:latin typeface="Calibri" panose="020F0502020204030204" pitchFamily="34" charset="0"/>
+                <a:cs typeface="Calibri" panose="020F0502020204030204" pitchFamily="34" charset="0"/>
+              </a:rPr>
+              <a:t>(in int x)</a:t>
+            </a:r>
+          </a:p>
+          <a:p>
+            <a:r>
+              <a:rPr lang="en-IN" dirty="0">
+                <a:latin typeface="Calibri" panose="020F0502020204030204" pitchFamily="34" charset="0"/>
+                <a:cs typeface="Calibri" panose="020F0502020204030204" pitchFamily="34" charset="0"/>
+              </a:rPr>
+              <a:t>      {</a:t>
+            </a:r>
+          </a:p>
+          <a:p>
+            <a:r>
+              <a:rPr lang="en-IN" dirty="0">
+                <a:latin typeface="Calibri" panose="020F0502020204030204" pitchFamily="34" charset="0"/>
+                <a:cs typeface="Calibri" panose="020F0502020204030204" pitchFamily="34" charset="0"/>
+              </a:rPr>
+              <a:t>          Console.WriteLine("x="+x);</a:t>
+            </a:r>
+          </a:p>
+          <a:p>
+            <a:r>
+              <a:rPr lang="en-IN" dirty="0">
+                <a:latin typeface="Calibri" panose="020F0502020204030204" pitchFamily="34" charset="0"/>
+                <a:cs typeface="Calibri" panose="020F0502020204030204" pitchFamily="34" charset="0"/>
+              </a:rPr>
+              <a:t>       x=99;//error CS8331: Cannot assign to variable 'in int’          </a:t>
+            </a:r>
+          </a:p>
+          <a:p>
+            <a:r>
+              <a:rPr lang="en-IN" dirty="0">
+                <a:latin typeface="Calibri" panose="020F0502020204030204" pitchFamily="34" charset="0"/>
+                <a:cs typeface="Calibri" panose="020F0502020204030204" pitchFamily="34" charset="0"/>
+              </a:rPr>
+              <a:t>               //because it is a </a:t>
+            </a:r>
+            <a:r>
+              <a:rPr lang="en-IN" dirty="0" err="1">
+                <a:latin typeface="Calibri" panose="020F0502020204030204" pitchFamily="34" charset="0"/>
+                <a:cs typeface="Calibri" panose="020F0502020204030204" pitchFamily="34" charset="0"/>
+              </a:rPr>
+              <a:t>readonly</a:t>
+            </a:r>
+            <a:r>
+              <a:rPr lang="en-IN" dirty="0">
+                <a:latin typeface="Calibri" panose="020F0502020204030204" pitchFamily="34" charset="0"/>
+                <a:cs typeface="Calibri" panose="020F0502020204030204" pitchFamily="34" charset="0"/>
+              </a:rPr>
+              <a:t> variable          </a:t>
+            </a:r>
+          </a:p>
+          <a:p>
+            <a:r>
+              <a:rPr lang="en-IN" dirty="0">
+                <a:latin typeface="Calibri" panose="020F0502020204030204" pitchFamily="34" charset="0"/>
+                <a:cs typeface="Calibri" panose="020F0502020204030204" pitchFamily="34" charset="0"/>
+              </a:rPr>
+              <a:t>      }</a:t>
+            </a:r>
+          </a:p>
+          <a:p>
+            <a:r>
+              <a:rPr lang="en-IN" dirty="0">
+                <a:latin typeface="Calibri" panose="020F0502020204030204" pitchFamily="34" charset="0"/>
+                <a:cs typeface="Calibri" panose="020F0502020204030204" pitchFamily="34" charset="0"/>
+              </a:rPr>
+              <a:t>   </a:t>
+            </a:r>
+          </a:p>
+          <a:p>
+            <a:r>
+              <a:rPr lang="en-IN" dirty="0">
+                <a:latin typeface="Calibri" panose="020F0502020204030204" pitchFamily="34" charset="0"/>
+                <a:cs typeface="Calibri" panose="020F0502020204030204" pitchFamily="34" charset="0"/>
+              </a:rPr>
+              <a:t>}</a:t>
+            </a:r>
+          </a:p>
+        </p:txBody>
+      </p:sp>
+      <p:sp>
+        <p:nvSpPr>
+          <p:cNvPr id="7" name="TextBox 6">
+            <a:extLst>
+              <a:ext uri="{FF2B5EF4-FFF2-40B4-BE49-F238E27FC236}">
+                <a16:creationId xmlns:a16="http://schemas.microsoft.com/office/drawing/2014/main" id="{17E7DB0D-2EEE-5AD1-4634-415E4FA93A76}"/>
+              </a:ext>
+            </a:extLst>
+          </p:cNvPr>
+          <p:cNvSpPr txBox="1"/>
+          <p:nvPr/>
+        </p:nvSpPr>
+        <p:spPr>
+          <a:xfrm>
+            <a:off x="6400800" y="2552700"/>
+            <a:ext cx="4953000" cy="2585323"/>
+          </a:xfrm>
+          <a:prstGeom prst="rect">
+            <a:avLst/>
+          </a:prstGeom>
+          <a:solidFill>
+            <a:schemeClr val="accent2">
+              <a:lumMod val="40000"/>
+              <a:lumOff val="60000"/>
+            </a:schemeClr>
+          </a:solidFill>
+        </p:spPr>
+        <p:txBody>
+          <a:bodyPr wrap="square">
+            <a:spAutoFit/>
+          </a:bodyPr>
+          <a:lstStyle/>
+          <a:p>
+            <a:r>
+              <a:rPr lang="en-IN" dirty="0">
+                <a:latin typeface="Calibri" panose="020F0502020204030204" pitchFamily="34" charset="0"/>
+                <a:cs typeface="Calibri" panose="020F0502020204030204" pitchFamily="34" charset="0"/>
+              </a:rPr>
+              <a:t>public class HelloWorld</a:t>
+            </a:r>
+          </a:p>
+          <a:p>
+            <a:r>
+              <a:rPr lang="en-IN" dirty="0">
+                <a:latin typeface="Calibri" panose="020F0502020204030204" pitchFamily="34" charset="0"/>
+                <a:cs typeface="Calibri" panose="020F0502020204030204" pitchFamily="34" charset="0"/>
+              </a:rPr>
+              <a:t>{</a:t>
+            </a:r>
+          </a:p>
+          <a:p>
+            <a:r>
+              <a:rPr lang="en-IN" dirty="0">
+                <a:latin typeface="Calibri" panose="020F0502020204030204" pitchFamily="34" charset="0"/>
+                <a:cs typeface="Calibri" panose="020F0502020204030204" pitchFamily="34" charset="0"/>
+              </a:rPr>
+              <a:t>    public static void Main(string[] </a:t>
+            </a:r>
+            <a:r>
+              <a:rPr lang="en-IN" dirty="0" err="1">
+                <a:latin typeface="Calibri" panose="020F0502020204030204" pitchFamily="34" charset="0"/>
+                <a:cs typeface="Calibri" panose="020F0502020204030204" pitchFamily="34" charset="0"/>
+              </a:rPr>
+              <a:t>args</a:t>
+            </a:r>
+            <a:r>
+              <a:rPr lang="en-IN" dirty="0">
+                <a:latin typeface="Calibri" panose="020F0502020204030204" pitchFamily="34" charset="0"/>
+                <a:cs typeface="Calibri" panose="020F0502020204030204" pitchFamily="34" charset="0"/>
+              </a:rPr>
+              <a:t>)</a:t>
+            </a:r>
+          </a:p>
+          <a:p>
+            <a:r>
+              <a:rPr lang="en-IN" dirty="0">
+                <a:latin typeface="Calibri" panose="020F0502020204030204" pitchFamily="34" charset="0"/>
+                <a:cs typeface="Calibri" panose="020F0502020204030204" pitchFamily="34" charset="0"/>
+              </a:rPr>
+              <a:t>    {</a:t>
+            </a:r>
+          </a:p>
+          <a:p>
+            <a:r>
+              <a:rPr lang="en-IN" dirty="0">
+                <a:latin typeface="Calibri" panose="020F0502020204030204" pitchFamily="34" charset="0"/>
+                <a:cs typeface="Calibri" panose="020F0502020204030204" pitchFamily="34" charset="0"/>
+              </a:rPr>
+              <a:t>        </a:t>
+            </a:r>
+            <a:r>
+              <a:rPr lang="en-IN" dirty="0" err="1">
+                <a:latin typeface="Calibri" panose="020F0502020204030204" pitchFamily="34" charset="0"/>
+                <a:cs typeface="Calibri" panose="020F0502020204030204" pitchFamily="34" charset="0"/>
+              </a:rPr>
+              <a:t>MyClass</a:t>
+            </a:r>
+            <a:r>
+              <a:rPr lang="en-IN" dirty="0">
+                <a:latin typeface="Calibri" panose="020F0502020204030204" pitchFamily="34" charset="0"/>
+                <a:cs typeface="Calibri" panose="020F0502020204030204" pitchFamily="34" charset="0"/>
+              </a:rPr>
+              <a:t> </a:t>
+            </a:r>
+            <a:r>
+              <a:rPr lang="en-IN" dirty="0" err="1">
+                <a:latin typeface="Calibri" panose="020F0502020204030204" pitchFamily="34" charset="0"/>
+                <a:cs typeface="Calibri" panose="020F0502020204030204" pitchFamily="34" charset="0"/>
+              </a:rPr>
+              <a:t>mObj</a:t>
+            </a:r>
+            <a:r>
+              <a:rPr lang="en-IN" dirty="0">
+                <a:latin typeface="Calibri" panose="020F0502020204030204" pitchFamily="34" charset="0"/>
+                <a:cs typeface="Calibri" panose="020F0502020204030204" pitchFamily="34" charset="0"/>
+              </a:rPr>
+              <a:t>=new </a:t>
+            </a:r>
+            <a:r>
+              <a:rPr lang="en-IN" dirty="0" err="1">
+                <a:latin typeface="Calibri" panose="020F0502020204030204" pitchFamily="34" charset="0"/>
+                <a:cs typeface="Calibri" panose="020F0502020204030204" pitchFamily="34" charset="0"/>
+              </a:rPr>
+              <a:t>MyClass</a:t>
+            </a:r>
+            <a:r>
+              <a:rPr lang="en-IN" dirty="0">
+                <a:latin typeface="Calibri" panose="020F0502020204030204" pitchFamily="34" charset="0"/>
+                <a:cs typeface="Calibri" panose="020F0502020204030204" pitchFamily="34" charset="0"/>
+              </a:rPr>
+              <a:t>();</a:t>
+            </a:r>
+          </a:p>
+          <a:p>
+            <a:r>
+              <a:rPr lang="en-IN" dirty="0">
+                <a:latin typeface="Calibri" panose="020F0502020204030204" pitchFamily="34" charset="0"/>
+                <a:cs typeface="Calibri" panose="020F0502020204030204" pitchFamily="34" charset="0"/>
+              </a:rPr>
+              <a:t>        int a=100;</a:t>
+            </a:r>
+          </a:p>
+          <a:p>
+            <a:r>
+              <a:rPr lang="en-IN" dirty="0">
+                <a:latin typeface="Calibri" panose="020F0502020204030204" pitchFamily="34" charset="0"/>
+                <a:cs typeface="Calibri" panose="020F0502020204030204" pitchFamily="34" charset="0"/>
+              </a:rPr>
+              <a:t>        </a:t>
+            </a:r>
+            <a:r>
+              <a:rPr lang="en-IN" dirty="0" err="1">
+                <a:latin typeface="Calibri" panose="020F0502020204030204" pitchFamily="34" charset="0"/>
+                <a:cs typeface="Calibri" panose="020F0502020204030204" pitchFamily="34" charset="0"/>
+              </a:rPr>
+              <a:t>mObj.inDemo</a:t>
+            </a:r>
+            <a:r>
+              <a:rPr lang="en-IN" dirty="0">
+                <a:latin typeface="Calibri" panose="020F0502020204030204" pitchFamily="34" charset="0"/>
+                <a:cs typeface="Calibri" panose="020F0502020204030204" pitchFamily="34" charset="0"/>
+              </a:rPr>
+              <a:t>( a);</a:t>
+            </a:r>
+          </a:p>
+          <a:p>
+            <a:r>
+              <a:rPr lang="en-IN" dirty="0">
+                <a:latin typeface="Calibri" panose="020F0502020204030204" pitchFamily="34" charset="0"/>
+                <a:cs typeface="Calibri" panose="020F0502020204030204" pitchFamily="34" charset="0"/>
+              </a:rPr>
+              <a:t>    }</a:t>
+            </a:r>
+          </a:p>
+          <a:p>
+            <a:r>
+              <a:rPr lang="en-IN" dirty="0">
+                <a:latin typeface="Calibri" panose="020F0502020204030204" pitchFamily="34" charset="0"/>
+                <a:cs typeface="Calibri" panose="020F0502020204030204" pitchFamily="34" charset="0"/>
+              </a:rPr>
+              <a:t>}</a:t>
+            </a:r>
+          </a:p>
+        </p:txBody>
+      </p:sp>
+    </p:spTree>
+    <p:extLst>
+      <p:ext uri="{BB962C8B-B14F-4D97-AF65-F5344CB8AC3E}">
+        <p14:creationId xmlns:p14="http://schemas.microsoft.com/office/powerpoint/2010/main" val="1075427294"/>
+      </p:ext>
+    </p:extLst>
+  </p:cSld>
+  <p:clrMapOvr>
+    <a:masterClrMapping/>
+  </p:clrMapOvr>
+</p:sld>
+</file>
+
+<file path=ppt/slides/slide33.xml><?xml version="1.0" encoding="utf-8"?>
+<p:sld xmlns:a="http://schemas.openxmlformats.org/drawingml/2006/main" xmlns:r="http://schemas.openxmlformats.org/officeDocument/2006/relationships" xmlns:p="http://schemas.openxmlformats.org/presentationml/2006/main">
+  <p:cSld>
+    <p:spTree>
+      <p:nvGrpSpPr>
+        <p:cNvPr id="1" name=""/>
+        <p:cNvGrpSpPr/>
+        <p:nvPr/>
+      </p:nvGrpSpPr>
+      <p:grpSpPr>
+        <a:xfrm>
+          <a:off x="0" y="0"/>
+          <a:ext cx="0" cy="0"/>
+          <a:chOff x="0" y="0"/>
+          <a:chExt cx="0" cy="0"/>
+        </a:xfrm>
+      </p:grpSpPr>
+      <p:sp>
+        <p:nvSpPr>
+          <p:cNvPr id="2" name="Title 1">
+            <a:extLst>
+              <a:ext uri="{FF2B5EF4-FFF2-40B4-BE49-F238E27FC236}">
+                <a16:creationId xmlns:a16="http://schemas.microsoft.com/office/drawing/2014/main" id="{EF7D508E-2CCE-9872-453C-8128E8FBE3C8}"/>
+              </a:ext>
+            </a:extLst>
+          </p:cNvPr>
+          <p:cNvSpPr>
+            <a:spLocks noGrp="1"/>
+          </p:cNvSpPr>
+          <p:nvPr>
+            <p:ph type="title"/>
+          </p:nvPr>
+        </p:nvSpPr>
+        <p:spPr/>
+        <p:txBody>
+          <a:bodyPr/>
+          <a:lstStyle/>
+          <a:p>
+            <a:r>
+              <a:rPr lang="en-IN" dirty="0"/>
+              <a:t>Parameter array (Params)</a:t>
+            </a:r>
+          </a:p>
+        </p:txBody>
+      </p:sp>
+      <p:sp>
+        <p:nvSpPr>
+          <p:cNvPr id="3" name="Content Placeholder 2">
+            <a:extLst>
+              <a:ext uri="{FF2B5EF4-FFF2-40B4-BE49-F238E27FC236}">
+                <a16:creationId xmlns:a16="http://schemas.microsoft.com/office/drawing/2014/main" id="{71D195AD-A37C-3A4C-AB66-DCFAB92C6CA2}"/>
+              </a:ext>
+            </a:extLst>
+          </p:cNvPr>
+          <p:cNvSpPr>
+            <a:spLocks noGrp="1"/>
+          </p:cNvSpPr>
+          <p:nvPr>
+            <p:ph idx="1"/>
+          </p:nvPr>
+        </p:nvSpPr>
+        <p:spPr/>
+        <p:txBody>
+          <a:bodyPr>
+            <a:normAutofit fontScale="92500" lnSpcReduction="10000"/>
+          </a:bodyPr>
+          <a:lstStyle/>
+          <a:p>
+            <a:r>
+              <a:rPr lang="en-US" b="0" i="0" dirty="0">
+                <a:solidFill>
+                  <a:srgbClr val="273239"/>
+                </a:solidFill>
+                <a:effectLst/>
+                <a:highlight>
+                  <a:srgbClr val="FFFFFF"/>
+                </a:highlight>
+                <a:latin typeface="Nunito" pitchFamily="2" charset="0"/>
+              </a:rPr>
+              <a:t>It is useful when the programmer doesn’t have any prior knowledge about the number of parameters to be used. By using params you are allowed to pass any variable number of arguments. </a:t>
+            </a:r>
+          </a:p>
+          <a:p>
+            <a:r>
+              <a:rPr lang="en-US" b="0" i="0" dirty="0">
+                <a:solidFill>
+                  <a:srgbClr val="273239"/>
+                </a:solidFill>
+                <a:effectLst/>
+                <a:highlight>
+                  <a:srgbClr val="FFFFFF"/>
+                </a:highlight>
+                <a:latin typeface="Nunito" pitchFamily="2" charset="0"/>
+              </a:rPr>
+              <a:t>Only one params keyword is allowed and no additional Params will be allowed in function declaration after a params keyword. </a:t>
+            </a:r>
+          </a:p>
+          <a:p>
+            <a:r>
+              <a:rPr lang="en-US" b="0" i="0" dirty="0">
+                <a:solidFill>
+                  <a:srgbClr val="273239"/>
+                </a:solidFill>
+                <a:effectLst/>
+                <a:highlight>
+                  <a:srgbClr val="FFFFFF"/>
+                </a:highlight>
+                <a:latin typeface="Nunito" pitchFamily="2" charset="0"/>
+              </a:rPr>
+              <a:t>The length of params will be zero if no arguments will be passed.</a:t>
+            </a:r>
+            <a:endParaRPr lang="en-IN" dirty="0"/>
+          </a:p>
+        </p:txBody>
+      </p:sp>
+    </p:spTree>
+    <p:extLst>
+      <p:ext uri="{BB962C8B-B14F-4D97-AF65-F5344CB8AC3E}">
+        <p14:creationId xmlns:p14="http://schemas.microsoft.com/office/powerpoint/2010/main" val="579904287"/>
+      </p:ext>
+    </p:extLst>
+  </p:cSld>
+  <p:clrMapOvr>
+    <a:masterClrMapping/>
+  </p:clrMapOvr>
+</p:sld>
+</file>
+
+<file path=ppt/slides/slide34.xml><?xml version="1.0" encoding="utf-8"?>
+<p:sld xmlns:a="http://schemas.openxmlformats.org/drawingml/2006/main" xmlns:r="http://schemas.openxmlformats.org/officeDocument/2006/relationships" xmlns:p="http://schemas.openxmlformats.org/presentationml/2006/main">
+  <p:cSld>
+    <p:spTree>
+      <p:nvGrpSpPr>
+        <p:cNvPr id="1" name=""/>
+        <p:cNvGrpSpPr/>
+        <p:nvPr/>
+      </p:nvGrpSpPr>
+      <p:grpSpPr>
+        <a:xfrm>
+          <a:off x="0" y="0"/>
+          <a:ext cx="0" cy="0"/>
+          <a:chOff x="0" y="0"/>
+          <a:chExt cx="0" cy="0"/>
+        </a:xfrm>
+      </p:grpSpPr>
+      <p:sp>
+        <p:nvSpPr>
+          <p:cNvPr id="7" name="TextBox 6">
+            <a:extLst>
+              <a:ext uri="{FF2B5EF4-FFF2-40B4-BE49-F238E27FC236}">
+                <a16:creationId xmlns:a16="http://schemas.microsoft.com/office/drawing/2014/main" id="{05129A88-862F-3AE1-D085-7C6F9EC491F2}"/>
+              </a:ext>
+            </a:extLst>
+          </p:cNvPr>
+          <p:cNvSpPr txBox="1"/>
+          <p:nvPr/>
+        </p:nvSpPr>
+        <p:spPr>
+          <a:xfrm>
+            <a:off x="299014" y="69854"/>
+            <a:ext cx="5949386" cy="3693319"/>
+          </a:xfrm>
+          <a:prstGeom prst="rect">
+            <a:avLst/>
+          </a:prstGeom>
+          <a:solidFill>
+            <a:schemeClr val="accent1">
+              <a:lumMod val="40000"/>
+              <a:lumOff val="60000"/>
+            </a:schemeClr>
+          </a:solidFill>
+        </p:spPr>
+        <p:txBody>
+          <a:bodyPr wrap="square">
+            <a:spAutoFit/>
+          </a:bodyPr>
+          <a:lstStyle/>
+          <a:p>
+            <a:r>
+              <a:rPr lang="en-IN" dirty="0">
+                <a:latin typeface="Calibri" panose="020F0502020204030204" pitchFamily="34" charset="0"/>
+                <a:cs typeface="Calibri" panose="020F0502020204030204" pitchFamily="34" charset="0"/>
+              </a:rPr>
+              <a:t>class </a:t>
+            </a:r>
+            <a:r>
+              <a:rPr lang="en-IN" dirty="0" err="1">
+                <a:latin typeface="Calibri" panose="020F0502020204030204" pitchFamily="34" charset="0"/>
+                <a:cs typeface="Calibri" panose="020F0502020204030204" pitchFamily="34" charset="0"/>
+              </a:rPr>
+              <a:t>MyClass</a:t>
+            </a:r>
+            <a:endParaRPr lang="en-IN" dirty="0">
+              <a:latin typeface="Calibri" panose="020F0502020204030204" pitchFamily="34" charset="0"/>
+              <a:cs typeface="Calibri" panose="020F0502020204030204" pitchFamily="34" charset="0"/>
+            </a:endParaRPr>
+          </a:p>
+          <a:p>
+            <a:r>
+              <a:rPr lang="en-IN" dirty="0">
+                <a:latin typeface="Calibri" panose="020F0502020204030204" pitchFamily="34" charset="0"/>
+                <a:cs typeface="Calibri" panose="020F0502020204030204" pitchFamily="34" charset="0"/>
+              </a:rPr>
+              <a:t>{</a:t>
+            </a:r>
+          </a:p>
+          <a:p>
+            <a:r>
+              <a:rPr lang="en-IN" dirty="0">
+                <a:latin typeface="Calibri" panose="020F0502020204030204" pitchFamily="34" charset="0"/>
+                <a:cs typeface="Calibri" panose="020F0502020204030204" pitchFamily="34" charset="0"/>
+              </a:rPr>
+              <a:t>      </a:t>
+            </a:r>
+          </a:p>
+          <a:p>
+            <a:r>
+              <a:rPr lang="en-IN" dirty="0">
+                <a:latin typeface="Calibri" panose="020F0502020204030204" pitchFamily="34" charset="0"/>
+                <a:cs typeface="Calibri" panose="020F0502020204030204" pitchFamily="34" charset="0"/>
+              </a:rPr>
+              <a:t>      public void </a:t>
+            </a:r>
+            <a:r>
+              <a:rPr lang="en-IN" dirty="0" err="1">
+                <a:latin typeface="Calibri" panose="020F0502020204030204" pitchFamily="34" charset="0"/>
+                <a:cs typeface="Calibri" panose="020F0502020204030204" pitchFamily="34" charset="0"/>
+              </a:rPr>
+              <a:t>showAll</a:t>
+            </a:r>
+            <a:r>
+              <a:rPr lang="en-IN" dirty="0">
+                <a:latin typeface="Calibri" panose="020F0502020204030204" pitchFamily="34" charset="0"/>
+                <a:cs typeface="Calibri" panose="020F0502020204030204" pitchFamily="34" charset="0"/>
+              </a:rPr>
+              <a:t>(params int[]n)</a:t>
+            </a:r>
+          </a:p>
+          <a:p>
+            <a:r>
+              <a:rPr lang="en-IN" dirty="0">
+                <a:latin typeface="Calibri" panose="020F0502020204030204" pitchFamily="34" charset="0"/>
+                <a:cs typeface="Calibri" panose="020F0502020204030204" pitchFamily="34" charset="0"/>
+              </a:rPr>
+              <a:t>      {</a:t>
+            </a:r>
+          </a:p>
+          <a:p>
+            <a:r>
+              <a:rPr lang="en-IN" dirty="0">
+                <a:latin typeface="Calibri" panose="020F0502020204030204" pitchFamily="34" charset="0"/>
+                <a:cs typeface="Calibri" panose="020F0502020204030204" pitchFamily="34" charset="0"/>
+              </a:rPr>
+              <a:t>          Console.WriteLine("Total Numbers are :"+</a:t>
+            </a:r>
+            <a:r>
+              <a:rPr lang="en-IN" dirty="0" err="1">
+                <a:latin typeface="Calibri" panose="020F0502020204030204" pitchFamily="34" charset="0"/>
+                <a:cs typeface="Calibri" panose="020F0502020204030204" pitchFamily="34" charset="0"/>
+              </a:rPr>
+              <a:t>n.Length</a:t>
+            </a:r>
+            <a:r>
+              <a:rPr lang="en-IN" dirty="0">
+                <a:latin typeface="Calibri" panose="020F0502020204030204" pitchFamily="34" charset="0"/>
+                <a:cs typeface="Calibri" panose="020F0502020204030204" pitchFamily="34" charset="0"/>
+              </a:rPr>
+              <a:t>);</a:t>
+            </a:r>
+          </a:p>
+          <a:p>
+            <a:r>
+              <a:rPr lang="en-IN" dirty="0">
+                <a:latin typeface="Calibri" panose="020F0502020204030204" pitchFamily="34" charset="0"/>
+                <a:cs typeface="Calibri" panose="020F0502020204030204" pitchFamily="34" charset="0"/>
+              </a:rPr>
+              <a:t>          for(int i=0;i&lt;</a:t>
+            </a:r>
+            <a:r>
+              <a:rPr lang="en-IN" dirty="0" err="1">
+                <a:latin typeface="Calibri" panose="020F0502020204030204" pitchFamily="34" charset="0"/>
+                <a:cs typeface="Calibri" panose="020F0502020204030204" pitchFamily="34" charset="0"/>
+              </a:rPr>
+              <a:t>n.Length;i</a:t>
+            </a:r>
+            <a:r>
+              <a:rPr lang="en-IN" dirty="0">
+                <a:latin typeface="Calibri" panose="020F0502020204030204" pitchFamily="34" charset="0"/>
+                <a:cs typeface="Calibri" panose="020F0502020204030204" pitchFamily="34" charset="0"/>
+              </a:rPr>
+              <a:t>++)</a:t>
+            </a:r>
+          </a:p>
+          <a:p>
+            <a:r>
+              <a:rPr lang="en-IN" dirty="0">
+                <a:latin typeface="Calibri" panose="020F0502020204030204" pitchFamily="34" charset="0"/>
+                <a:cs typeface="Calibri" panose="020F0502020204030204" pitchFamily="34" charset="0"/>
+              </a:rPr>
+              <a:t>          {</a:t>
+            </a:r>
+          </a:p>
+          <a:p>
+            <a:r>
+              <a:rPr lang="en-IN" dirty="0">
+                <a:latin typeface="Calibri" panose="020F0502020204030204" pitchFamily="34" charset="0"/>
+                <a:cs typeface="Calibri" panose="020F0502020204030204" pitchFamily="34" charset="0"/>
+              </a:rPr>
+              <a:t>              Console.WriteLine(n[i]);</a:t>
+            </a:r>
+          </a:p>
+          <a:p>
+            <a:r>
+              <a:rPr lang="en-IN" dirty="0">
+                <a:latin typeface="Calibri" panose="020F0502020204030204" pitchFamily="34" charset="0"/>
+                <a:cs typeface="Calibri" panose="020F0502020204030204" pitchFamily="34" charset="0"/>
+              </a:rPr>
+              <a:t>          }</a:t>
+            </a:r>
+          </a:p>
+          <a:p>
+            <a:r>
+              <a:rPr lang="en-IN" dirty="0">
+                <a:latin typeface="Calibri" panose="020F0502020204030204" pitchFamily="34" charset="0"/>
+                <a:cs typeface="Calibri" panose="020F0502020204030204" pitchFamily="34" charset="0"/>
+              </a:rPr>
+              <a:t>      }</a:t>
+            </a:r>
+          </a:p>
+          <a:p>
+            <a:r>
+              <a:rPr lang="en-IN" dirty="0">
+                <a:latin typeface="Calibri" panose="020F0502020204030204" pitchFamily="34" charset="0"/>
+                <a:cs typeface="Calibri" panose="020F0502020204030204" pitchFamily="34" charset="0"/>
+              </a:rPr>
+              <a:t>   </a:t>
+            </a:r>
+          </a:p>
+          <a:p>
+            <a:r>
+              <a:rPr lang="en-IN" dirty="0">
+                <a:latin typeface="Calibri" panose="020F0502020204030204" pitchFamily="34" charset="0"/>
+                <a:cs typeface="Calibri" panose="020F0502020204030204" pitchFamily="34" charset="0"/>
+              </a:rPr>
+              <a:t>}</a:t>
+            </a:r>
+          </a:p>
+        </p:txBody>
+      </p:sp>
+      <p:sp>
+        <p:nvSpPr>
+          <p:cNvPr id="9" name="TextBox 8">
+            <a:extLst>
+              <a:ext uri="{FF2B5EF4-FFF2-40B4-BE49-F238E27FC236}">
+                <a16:creationId xmlns:a16="http://schemas.microsoft.com/office/drawing/2014/main" id="{B454DD76-5A7F-60E7-EEBE-F0B91C7D03B3}"/>
+              </a:ext>
+            </a:extLst>
+          </p:cNvPr>
+          <p:cNvSpPr txBox="1"/>
+          <p:nvPr/>
+        </p:nvSpPr>
+        <p:spPr>
+          <a:xfrm>
+            <a:off x="3543300" y="2021681"/>
+            <a:ext cx="5410200" cy="3693319"/>
+          </a:xfrm>
+          <a:prstGeom prst="rect">
+            <a:avLst/>
+          </a:prstGeom>
+          <a:solidFill>
+            <a:schemeClr val="accent2">
+              <a:lumMod val="20000"/>
+              <a:lumOff val="80000"/>
+            </a:schemeClr>
+          </a:solidFill>
+        </p:spPr>
+        <p:txBody>
+          <a:bodyPr wrap="square">
+            <a:spAutoFit/>
+          </a:bodyPr>
+          <a:lstStyle/>
+          <a:p>
+            <a:r>
+              <a:rPr lang="en-IN" dirty="0">
+                <a:latin typeface="Calibri" panose="020F0502020204030204" pitchFamily="34" charset="0"/>
+                <a:cs typeface="Calibri" panose="020F0502020204030204" pitchFamily="34" charset="0"/>
+              </a:rPr>
+              <a:t>public class HelloWorld</a:t>
+            </a:r>
+          </a:p>
+          <a:p>
+            <a:r>
+              <a:rPr lang="en-IN" dirty="0">
+                <a:latin typeface="Calibri" panose="020F0502020204030204" pitchFamily="34" charset="0"/>
+                <a:cs typeface="Calibri" panose="020F0502020204030204" pitchFamily="34" charset="0"/>
+              </a:rPr>
+              <a:t>{</a:t>
+            </a:r>
+          </a:p>
+          <a:p>
+            <a:r>
+              <a:rPr lang="en-IN" dirty="0">
+                <a:latin typeface="Calibri" panose="020F0502020204030204" pitchFamily="34" charset="0"/>
+                <a:cs typeface="Calibri" panose="020F0502020204030204" pitchFamily="34" charset="0"/>
+              </a:rPr>
+              <a:t>    public static void Main(string[] </a:t>
+            </a:r>
+            <a:r>
+              <a:rPr lang="en-IN" dirty="0" err="1">
+                <a:latin typeface="Calibri" panose="020F0502020204030204" pitchFamily="34" charset="0"/>
+                <a:cs typeface="Calibri" panose="020F0502020204030204" pitchFamily="34" charset="0"/>
+              </a:rPr>
+              <a:t>args</a:t>
+            </a:r>
+            <a:r>
+              <a:rPr lang="en-IN" dirty="0">
+                <a:latin typeface="Calibri" panose="020F0502020204030204" pitchFamily="34" charset="0"/>
+                <a:cs typeface="Calibri" panose="020F0502020204030204" pitchFamily="34" charset="0"/>
+              </a:rPr>
+              <a:t>)</a:t>
+            </a:r>
+          </a:p>
+          <a:p>
+            <a:r>
+              <a:rPr lang="en-IN" dirty="0">
+                <a:latin typeface="Calibri" panose="020F0502020204030204" pitchFamily="34" charset="0"/>
+                <a:cs typeface="Calibri" panose="020F0502020204030204" pitchFamily="34" charset="0"/>
+              </a:rPr>
+              <a:t>    {</a:t>
+            </a:r>
+          </a:p>
+          <a:p>
+            <a:r>
+              <a:rPr lang="en-IN" dirty="0">
+                <a:latin typeface="Calibri" panose="020F0502020204030204" pitchFamily="34" charset="0"/>
+                <a:cs typeface="Calibri" panose="020F0502020204030204" pitchFamily="34" charset="0"/>
+              </a:rPr>
+              <a:t>        </a:t>
+            </a:r>
+            <a:r>
+              <a:rPr lang="en-IN" dirty="0" err="1">
+                <a:latin typeface="Calibri" panose="020F0502020204030204" pitchFamily="34" charset="0"/>
+                <a:cs typeface="Calibri" panose="020F0502020204030204" pitchFamily="34" charset="0"/>
+              </a:rPr>
+              <a:t>MyClass</a:t>
+            </a:r>
+            <a:r>
+              <a:rPr lang="en-IN" dirty="0">
+                <a:latin typeface="Calibri" panose="020F0502020204030204" pitchFamily="34" charset="0"/>
+                <a:cs typeface="Calibri" panose="020F0502020204030204" pitchFamily="34" charset="0"/>
+              </a:rPr>
+              <a:t> </a:t>
+            </a:r>
+            <a:r>
+              <a:rPr lang="en-IN" dirty="0" err="1">
+                <a:latin typeface="Calibri" panose="020F0502020204030204" pitchFamily="34" charset="0"/>
+                <a:cs typeface="Calibri" panose="020F0502020204030204" pitchFamily="34" charset="0"/>
+              </a:rPr>
+              <a:t>mObj</a:t>
+            </a:r>
+            <a:r>
+              <a:rPr lang="en-IN" dirty="0">
+                <a:latin typeface="Calibri" panose="020F0502020204030204" pitchFamily="34" charset="0"/>
+                <a:cs typeface="Calibri" panose="020F0502020204030204" pitchFamily="34" charset="0"/>
+              </a:rPr>
+              <a:t>=new </a:t>
+            </a:r>
+            <a:r>
+              <a:rPr lang="en-IN" dirty="0" err="1">
+                <a:latin typeface="Calibri" panose="020F0502020204030204" pitchFamily="34" charset="0"/>
+                <a:cs typeface="Calibri" panose="020F0502020204030204" pitchFamily="34" charset="0"/>
+              </a:rPr>
+              <a:t>MyClass</a:t>
+            </a:r>
+            <a:r>
+              <a:rPr lang="en-IN" dirty="0">
+                <a:latin typeface="Calibri" panose="020F0502020204030204" pitchFamily="34" charset="0"/>
+                <a:cs typeface="Calibri" panose="020F0502020204030204" pitchFamily="34" charset="0"/>
+              </a:rPr>
+              <a:t>();</a:t>
+            </a:r>
+          </a:p>
+          <a:p>
+            <a:r>
+              <a:rPr lang="en-IN" dirty="0">
+                <a:latin typeface="Calibri" panose="020F0502020204030204" pitchFamily="34" charset="0"/>
+                <a:cs typeface="Calibri" panose="020F0502020204030204" pitchFamily="34" charset="0"/>
+              </a:rPr>
+              <a:t>        </a:t>
+            </a:r>
+            <a:r>
+              <a:rPr lang="en-IN" dirty="0" err="1">
+                <a:latin typeface="Calibri" panose="020F0502020204030204" pitchFamily="34" charset="0"/>
+                <a:cs typeface="Calibri" panose="020F0502020204030204" pitchFamily="34" charset="0"/>
+              </a:rPr>
+              <a:t>mObj.showAll</a:t>
+            </a:r>
+            <a:r>
+              <a:rPr lang="en-IN" dirty="0">
+                <a:latin typeface="Calibri" panose="020F0502020204030204" pitchFamily="34" charset="0"/>
+                <a:cs typeface="Calibri" panose="020F0502020204030204" pitchFamily="34" charset="0"/>
+              </a:rPr>
+              <a:t>(11,22,33);//valid</a:t>
+            </a:r>
+          </a:p>
+          <a:p>
+            <a:r>
+              <a:rPr lang="en-IN" dirty="0">
+                <a:latin typeface="Calibri" panose="020F0502020204030204" pitchFamily="34" charset="0"/>
+                <a:cs typeface="Calibri" panose="020F0502020204030204" pitchFamily="34" charset="0"/>
+              </a:rPr>
+              <a:t>        Console.WriteLine("----------------");</a:t>
+            </a:r>
+          </a:p>
+          <a:p>
+            <a:r>
+              <a:rPr lang="en-IN" dirty="0">
+                <a:latin typeface="Calibri" panose="020F0502020204030204" pitchFamily="34" charset="0"/>
+                <a:cs typeface="Calibri" panose="020F0502020204030204" pitchFamily="34" charset="0"/>
+              </a:rPr>
+              <a:t>        </a:t>
+            </a:r>
+            <a:r>
+              <a:rPr lang="en-IN" dirty="0" err="1">
+                <a:latin typeface="Calibri" panose="020F0502020204030204" pitchFamily="34" charset="0"/>
+                <a:cs typeface="Calibri" panose="020F0502020204030204" pitchFamily="34" charset="0"/>
+              </a:rPr>
+              <a:t>mObj.showAll</a:t>
+            </a:r>
+            <a:r>
+              <a:rPr lang="en-IN" dirty="0">
+                <a:latin typeface="Calibri" panose="020F0502020204030204" pitchFamily="34" charset="0"/>
+                <a:cs typeface="Calibri" panose="020F0502020204030204" pitchFamily="34" charset="0"/>
+              </a:rPr>
+              <a:t>(100,200);//valid</a:t>
+            </a:r>
+          </a:p>
+          <a:p>
+            <a:r>
+              <a:rPr lang="en-IN" dirty="0">
+                <a:latin typeface="Calibri" panose="020F0502020204030204" pitchFamily="34" charset="0"/>
+                <a:cs typeface="Calibri" panose="020F0502020204030204" pitchFamily="34" charset="0"/>
+              </a:rPr>
+              <a:t>        Console.WriteLine("----------------");</a:t>
+            </a:r>
+          </a:p>
+          <a:p>
+            <a:r>
+              <a:rPr lang="en-IN" dirty="0">
+                <a:latin typeface="Calibri" panose="020F0502020204030204" pitchFamily="34" charset="0"/>
+                <a:cs typeface="Calibri" panose="020F0502020204030204" pitchFamily="34" charset="0"/>
+              </a:rPr>
+              <a:t>        </a:t>
+            </a:r>
+            <a:r>
+              <a:rPr lang="en-IN" dirty="0" err="1">
+                <a:latin typeface="Calibri" panose="020F0502020204030204" pitchFamily="34" charset="0"/>
+                <a:cs typeface="Calibri" panose="020F0502020204030204" pitchFamily="34" charset="0"/>
+              </a:rPr>
+              <a:t>mObj.showAll</a:t>
+            </a:r>
+            <a:r>
+              <a:rPr lang="en-IN" dirty="0">
+                <a:latin typeface="Calibri" panose="020F0502020204030204" pitchFamily="34" charset="0"/>
+                <a:cs typeface="Calibri" panose="020F0502020204030204" pitchFamily="34" charset="0"/>
+              </a:rPr>
+              <a:t>();//valid</a:t>
+            </a:r>
+          </a:p>
+          <a:p>
+            <a:r>
+              <a:rPr lang="en-IN" dirty="0">
+                <a:latin typeface="Calibri" panose="020F0502020204030204" pitchFamily="34" charset="0"/>
+                <a:cs typeface="Calibri" panose="020F0502020204030204" pitchFamily="34" charset="0"/>
+              </a:rPr>
+              <a:t>        </a:t>
+            </a:r>
+          </a:p>
+          <a:p>
+            <a:r>
+              <a:rPr lang="en-IN" dirty="0">
+                <a:latin typeface="Calibri" panose="020F0502020204030204" pitchFamily="34" charset="0"/>
+                <a:cs typeface="Calibri" panose="020F0502020204030204" pitchFamily="34" charset="0"/>
+              </a:rPr>
+              <a:t>    }</a:t>
+            </a:r>
+          </a:p>
+          <a:p>
+            <a:r>
+              <a:rPr lang="en-IN" dirty="0">
+                <a:latin typeface="Calibri" panose="020F0502020204030204" pitchFamily="34" charset="0"/>
+                <a:cs typeface="Calibri" panose="020F0502020204030204" pitchFamily="34" charset="0"/>
+              </a:rPr>
+              <a:t>}</a:t>
+            </a:r>
+          </a:p>
+        </p:txBody>
+      </p:sp>
+      <p:sp>
+        <p:nvSpPr>
+          <p:cNvPr id="11" name="TextBox 10">
+            <a:extLst>
+              <a:ext uri="{FF2B5EF4-FFF2-40B4-BE49-F238E27FC236}">
+                <a16:creationId xmlns:a16="http://schemas.microsoft.com/office/drawing/2014/main" id="{93241544-7216-03FA-4143-FA7A8B1D2923}"/>
+              </a:ext>
+            </a:extLst>
+          </p:cNvPr>
+          <p:cNvSpPr txBox="1"/>
+          <p:nvPr/>
+        </p:nvSpPr>
+        <p:spPr>
+          <a:xfrm>
+            <a:off x="8343900" y="876300"/>
+            <a:ext cx="3244286" cy="3139321"/>
+          </a:xfrm>
+          <a:prstGeom prst="rect">
+            <a:avLst/>
+          </a:prstGeom>
+          <a:solidFill>
+            <a:schemeClr val="tx2">
+              <a:lumMod val="40000"/>
+              <a:lumOff val="60000"/>
+            </a:schemeClr>
+          </a:solidFill>
+        </p:spPr>
+        <p:txBody>
+          <a:bodyPr wrap="square">
+            <a:spAutoFit/>
+          </a:bodyPr>
+          <a:lstStyle/>
+          <a:p>
+            <a:r>
+              <a:rPr lang="en-IN" dirty="0">
+                <a:latin typeface="Calibri" panose="020F0502020204030204" pitchFamily="34" charset="0"/>
+                <a:cs typeface="Calibri" panose="020F0502020204030204" pitchFamily="34" charset="0"/>
+              </a:rPr>
+              <a:t>OUTPUT</a:t>
+            </a:r>
+          </a:p>
+          <a:p>
+            <a:r>
+              <a:rPr lang="en-IN" dirty="0">
+                <a:latin typeface="Calibri" panose="020F0502020204030204" pitchFamily="34" charset="0"/>
+                <a:cs typeface="Calibri" panose="020F0502020204030204" pitchFamily="34" charset="0"/>
+              </a:rPr>
+              <a:t>Total Numbers are :3</a:t>
+            </a:r>
+          </a:p>
+          <a:p>
+            <a:r>
+              <a:rPr lang="en-IN" dirty="0">
+                <a:latin typeface="Calibri" panose="020F0502020204030204" pitchFamily="34" charset="0"/>
+                <a:cs typeface="Calibri" panose="020F0502020204030204" pitchFamily="34" charset="0"/>
+              </a:rPr>
+              <a:t>11</a:t>
+            </a:r>
+          </a:p>
+          <a:p>
+            <a:r>
+              <a:rPr lang="en-IN" dirty="0">
+                <a:latin typeface="Calibri" panose="020F0502020204030204" pitchFamily="34" charset="0"/>
+                <a:cs typeface="Calibri" panose="020F0502020204030204" pitchFamily="34" charset="0"/>
+              </a:rPr>
+              <a:t>22</a:t>
+            </a:r>
+          </a:p>
+          <a:p>
+            <a:r>
+              <a:rPr lang="en-IN" dirty="0">
+                <a:latin typeface="Calibri" panose="020F0502020204030204" pitchFamily="34" charset="0"/>
+                <a:cs typeface="Calibri" panose="020F0502020204030204" pitchFamily="34" charset="0"/>
+              </a:rPr>
+              <a:t>33</a:t>
+            </a:r>
+          </a:p>
+          <a:p>
+            <a:r>
+              <a:rPr lang="en-IN" dirty="0">
+                <a:latin typeface="Calibri" panose="020F0502020204030204" pitchFamily="34" charset="0"/>
+                <a:cs typeface="Calibri" panose="020F0502020204030204" pitchFamily="34" charset="0"/>
+              </a:rPr>
+              <a:t>----------------</a:t>
+            </a:r>
+          </a:p>
+          <a:p>
+            <a:r>
+              <a:rPr lang="en-IN" dirty="0">
+                <a:latin typeface="Calibri" panose="020F0502020204030204" pitchFamily="34" charset="0"/>
+                <a:cs typeface="Calibri" panose="020F0502020204030204" pitchFamily="34" charset="0"/>
+              </a:rPr>
+              <a:t>Total Numbers are :2</a:t>
+            </a:r>
+          </a:p>
+          <a:p>
+            <a:r>
+              <a:rPr lang="en-IN" dirty="0">
+                <a:latin typeface="Calibri" panose="020F0502020204030204" pitchFamily="34" charset="0"/>
+                <a:cs typeface="Calibri" panose="020F0502020204030204" pitchFamily="34" charset="0"/>
+              </a:rPr>
+              <a:t>100</a:t>
+            </a:r>
+          </a:p>
+          <a:p>
+            <a:r>
+              <a:rPr lang="en-IN" dirty="0">
+                <a:latin typeface="Calibri" panose="020F0502020204030204" pitchFamily="34" charset="0"/>
+                <a:cs typeface="Calibri" panose="020F0502020204030204" pitchFamily="34" charset="0"/>
+              </a:rPr>
+              <a:t>200</a:t>
+            </a:r>
+          </a:p>
+          <a:p>
+            <a:r>
+              <a:rPr lang="en-IN" dirty="0">
+                <a:latin typeface="Calibri" panose="020F0502020204030204" pitchFamily="34" charset="0"/>
+                <a:cs typeface="Calibri" panose="020F0502020204030204" pitchFamily="34" charset="0"/>
+              </a:rPr>
+              <a:t>----------------</a:t>
+            </a:r>
+          </a:p>
+          <a:p>
+            <a:r>
+              <a:rPr lang="en-IN" dirty="0">
+                <a:latin typeface="Calibri" panose="020F0502020204030204" pitchFamily="34" charset="0"/>
+                <a:cs typeface="Calibri" panose="020F0502020204030204" pitchFamily="34" charset="0"/>
+              </a:rPr>
+              <a:t>Total Numbers are :0</a:t>
+            </a:r>
+          </a:p>
+        </p:txBody>
+      </p:sp>
+    </p:spTree>
+    <p:extLst>
+      <p:ext uri="{BB962C8B-B14F-4D97-AF65-F5344CB8AC3E}">
+        <p14:creationId xmlns:p14="http://schemas.microsoft.com/office/powerpoint/2010/main" val="4153947678"/>
+      </p:ext>
+    </p:extLst>
+  </p:cSld>
+  <p:clrMapOvr>
+    <a:masterClrMapping/>
+  </p:clrMapOvr>
+</p:sld>
+</file>
+
+<file path=ppt/slides/slide35.xml><?xml version="1.0" encoding="utf-8"?>
+<p:sld xmlns:a="http://schemas.openxmlformats.org/drawingml/2006/main" xmlns:r="http://schemas.openxmlformats.org/officeDocument/2006/relationships" xmlns:p="http://schemas.openxmlformats.org/presentationml/2006/main">
+  <p:cSld>
+    <p:spTree>
+      <p:nvGrpSpPr>
+        <p:cNvPr id="1" name=""/>
+        <p:cNvGrpSpPr/>
+        <p:nvPr/>
+      </p:nvGrpSpPr>
+      <p:grpSpPr>
+        <a:xfrm>
+          <a:off x="0" y="0"/>
+          <a:ext cx="0" cy="0"/>
+          <a:chOff x="0" y="0"/>
+          <a:chExt cx="0" cy="0"/>
+        </a:xfrm>
+      </p:grpSpPr>
+      <p:sp>
+        <p:nvSpPr>
+          <p:cNvPr id="2" name="Title 1">
+            <a:extLst>
+              <a:ext uri="{FF2B5EF4-FFF2-40B4-BE49-F238E27FC236}">
+                <a16:creationId xmlns:a16="http://schemas.microsoft.com/office/drawing/2014/main" id="{8ADA6601-18C8-A8F1-B7AA-DAC3E15C142B}"/>
+              </a:ext>
+            </a:extLst>
+          </p:cNvPr>
+          <p:cNvSpPr>
+            <a:spLocks noGrp="1"/>
+          </p:cNvSpPr>
+          <p:nvPr>
+            <p:ph type="title"/>
+          </p:nvPr>
+        </p:nvSpPr>
+        <p:spPr/>
+        <p:txBody>
+          <a:bodyPr>
+            <a:normAutofit/>
+          </a:bodyPr>
+          <a:lstStyle/>
+          <a:p>
+            <a:r>
+              <a:rPr lang="en-US" b="1" i="0" dirty="0">
+                <a:solidFill>
+                  <a:srgbClr val="273239"/>
+                </a:solidFill>
+                <a:effectLst/>
+                <a:highlight>
+                  <a:srgbClr val="FFFFFF"/>
+                </a:highlight>
+                <a:latin typeface="Nunito" pitchFamily="2" charset="0"/>
+              </a:rPr>
+              <a:t>Default or Optional Parameters</a:t>
+            </a:r>
+            <a:endParaRPr lang="en-IN" dirty="0"/>
+          </a:p>
+        </p:txBody>
+      </p:sp>
+      <p:sp>
+        <p:nvSpPr>
+          <p:cNvPr id="3" name="Content Placeholder 2">
+            <a:extLst>
+              <a:ext uri="{FF2B5EF4-FFF2-40B4-BE49-F238E27FC236}">
+                <a16:creationId xmlns:a16="http://schemas.microsoft.com/office/drawing/2014/main" id="{42E05AA4-C852-CE2D-7CC8-7E2EA3EFEB90}"/>
+              </a:ext>
+            </a:extLst>
+          </p:cNvPr>
+          <p:cNvSpPr>
+            <a:spLocks noGrp="1"/>
+          </p:cNvSpPr>
+          <p:nvPr>
+            <p:ph idx="1"/>
+          </p:nvPr>
+        </p:nvSpPr>
+        <p:spPr/>
+        <p:txBody>
+          <a:bodyPr>
+            <a:normAutofit fontScale="62500" lnSpcReduction="20000"/>
+          </a:bodyPr>
+          <a:lstStyle/>
+          <a:p>
+            <a:pPr algn="l" fontAlgn="base"/>
+            <a:r>
+              <a:rPr lang="en-US" b="0" i="0" dirty="0">
+                <a:solidFill>
+                  <a:srgbClr val="273239"/>
+                </a:solidFill>
+                <a:effectLst/>
+                <a:highlight>
+                  <a:srgbClr val="FFFFFF"/>
+                </a:highlight>
+                <a:latin typeface="Nunito" pitchFamily="2" charset="0"/>
+              </a:rPr>
+              <a:t>As the name suggests optional parameters are not compulsory parameters, they are optional. </a:t>
+            </a:r>
+          </a:p>
+          <a:p>
+            <a:pPr algn="l" fontAlgn="base"/>
+            <a:r>
+              <a:rPr lang="en-US" b="0" i="0" dirty="0">
+                <a:solidFill>
+                  <a:srgbClr val="273239"/>
+                </a:solidFill>
+                <a:effectLst/>
+                <a:highlight>
+                  <a:srgbClr val="FFFFFF"/>
+                </a:highlight>
+                <a:latin typeface="Nunito" pitchFamily="2" charset="0"/>
+              </a:rPr>
+              <a:t>It helps to exclude arguments for some parameters. </a:t>
+            </a:r>
+          </a:p>
+          <a:p>
+            <a:pPr algn="l" fontAlgn="base"/>
+            <a:r>
+              <a:rPr lang="en-US" b="0" i="0" dirty="0">
+                <a:solidFill>
+                  <a:srgbClr val="273239"/>
+                </a:solidFill>
+                <a:effectLst/>
+                <a:highlight>
+                  <a:srgbClr val="FFFFFF"/>
+                </a:highlight>
+                <a:latin typeface="Nunito" pitchFamily="2" charset="0"/>
+              </a:rPr>
+              <a:t>In optional parameters, it is not necessary to pass all the parameters in the method. </a:t>
+            </a:r>
+          </a:p>
+          <a:p>
+            <a:pPr algn="l" fontAlgn="base"/>
+            <a:r>
+              <a:rPr lang="en-US" b="0" i="0" dirty="0">
+                <a:solidFill>
+                  <a:srgbClr val="273239"/>
+                </a:solidFill>
+                <a:effectLst/>
+                <a:highlight>
+                  <a:srgbClr val="FFFFFF"/>
+                </a:highlight>
+                <a:latin typeface="Nunito" pitchFamily="2" charset="0"/>
+              </a:rPr>
+              <a:t>Here, each and every optional parameter contains a default value which is the part of its definition. </a:t>
+            </a:r>
+          </a:p>
+          <a:p>
+            <a:pPr algn="l" fontAlgn="base"/>
+            <a:r>
+              <a:rPr lang="en-US" b="0" i="0" dirty="0">
+                <a:solidFill>
+                  <a:srgbClr val="273239"/>
+                </a:solidFill>
+                <a:effectLst/>
+                <a:highlight>
+                  <a:srgbClr val="FFFFFF"/>
+                </a:highlight>
+                <a:latin typeface="Nunito" pitchFamily="2" charset="0"/>
+              </a:rPr>
+              <a:t>If we do not pass any arguments to the optional parameters, then it takes its default value. </a:t>
+            </a:r>
+          </a:p>
+          <a:p>
+            <a:pPr algn="l" fontAlgn="base"/>
+            <a:r>
+              <a:rPr lang="en-US" b="0" i="0" dirty="0">
+                <a:solidFill>
+                  <a:srgbClr val="273239"/>
+                </a:solidFill>
+                <a:effectLst/>
+                <a:highlight>
+                  <a:srgbClr val="FFFFFF"/>
+                </a:highlight>
+                <a:latin typeface="Nunito" pitchFamily="2" charset="0"/>
+              </a:rPr>
+              <a:t>The optional parameters are always defined at the end of the parameter list. </a:t>
+            </a:r>
+          </a:p>
+          <a:p>
+            <a:pPr algn="l" fontAlgn="base"/>
+            <a:r>
+              <a:rPr lang="en-US" b="0" i="0" dirty="0">
+                <a:solidFill>
+                  <a:srgbClr val="273239"/>
+                </a:solidFill>
+                <a:effectLst/>
+                <a:highlight>
+                  <a:srgbClr val="FFFFFF"/>
+                </a:highlight>
+                <a:latin typeface="Nunito" pitchFamily="2" charset="0"/>
+              </a:rPr>
+              <a:t>Or in other words, the last parameter of the method, constructor, etc. is the optional parameter.</a:t>
+            </a:r>
+          </a:p>
+          <a:p>
+            <a:endParaRPr lang="en-IN" dirty="0"/>
+          </a:p>
+        </p:txBody>
+      </p:sp>
+    </p:spTree>
+    <p:extLst>
+      <p:ext uri="{BB962C8B-B14F-4D97-AF65-F5344CB8AC3E}">
+        <p14:creationId xmlns:p14="http://schemas.microsoft.com/office/powerpoint/2010/main" val="2887643990"/>
+      </p:ext>
+    </p:extLst>
+  </p:cSld>
+  <p:clrMapOvr>
+    <a:masterClrMapping/>
+  </p:clrMapOvr>
+</p:sld>
+</file>
+
+<file path=ppt/slides/slide36.xml><?xml version="1.0" encoding="utf-8"?>
 <p:sld xmlns:a="http://schemas.openxmlformats.org/drawingml/2006/main" xmlns:r="http://schemas.openxmlformats.org/officeDocument/2006/relationships" xmlns:p="http://schemas.openxmlformats.org/presentationml/2006/main">
   <p:cSld>
     <p:spTree>
@@ -10302,7 +12976,7 @@
 </p:sld>
 </file>
 
-<file path=ppt/slides/slide29.xml><?xml version="1.0" encoding="utf-8"?>
+<file path=ppt/slides/slide37.xml><?xml version="1.0" encoding="utf-8"?>
 <p:sld xmlns:a="http://schemas.openxmlformats.org/drawingml/2006/main" xmlns:r="http://schemas.openxmlformats.org/officeDocument/2006/relationships" xmlns:p="http://schemas.openxmlformats.org/presentationml/2006/main">
   <p:cSld>
     <p:spTree>
@@ -10375,161 +13049,6 @@
         <p14:creationId xmlns:p14="http://schemas.microsoft.com/office/powerpoint/2010/main" val="1067915313"/>
       </p:ext>
     </p:extLst>
-  </p:cSld>
-  <p:clrMapOvr>
-    <a:masterClrMapping/>
-  </p:clrMapOvr>
-</p:sld>
-</file>
-
-<file path=ppt/slides/slide3.xml><?xml version="1.0" encoding="utf-8"?>
-<p:sld xmlns:a="http://schemas.openxmlformats.org/drawingml/2006/main" xmlns:r="http://schemas.openxmlformats.org/officeDocument/2006/relationships" xmlns:p="http://schemas.openxmlformats.org/presentationml/2006/main">
-  <p:cSld>
-    <p:spTree>
-      <p:nvGrpSpPr>
-        <p:cNvPr id="1" name=""/>
-        <p:cNvGrpSpPr/>
-        <p:nvPr/>
-      </p:nvGrpSpPr>
-      <p:grpSpPr>
-        <a:xfrm>
-          <a:off x="0" y="0"/>
-          <a:ext cx="0" cy="0"/>
-          <a:chOff x="0" y="0"/>
-          <a:chExt cx="0" cy="0"/>
-        </a:xfrm>
-      </p:grpSpPr>
-      <p:sp>
-        <p:nvSpPr>
-          <p:cNvPr id="2" name="Title 1"/>
-          <p:cNvSpPr>
-            <a:spLocks noGrp="1"/>
-          </p:cNvSpPr>
-          <p:nvPr>
-            <p:ph type="title"/>
-          </p:nvPr>
-        </p:nvSpPr>
-        <p:spPr>
-          <a:xfrm>
-            <a:off x="1866290" y="-114299"/>
-            <a:ext cx="9747504" cy="952500"/>
-          </a:xfrm>
-        </p:spPr>
-        <p:txBody>
-          <a:bodyPr>
-            <a:normAutofit/>
-          </a:bodyPr>
-          <a:lstStyle/>
-          <a:p>
-            <a:r>
-              <a:rPr lang="en-US" b="1" dirty="0"/>
-              <a:t>Features of C# Structures</a:t>
-            </a:r>
-            <a:endParaRPr lang="en-US" dirty="0"/>
-          </a:p>
-        </p:txBody>
-      </p:sp>
-      <p:sp>
-        <p:nvSpPr>
-          <p:cNvPr id="3" name="Content Placeholder 2"/>
-          <p:cNvSpPr>
-            <a:spLocks noGrp="1"/>
-          </p:cNvSpPr>
-          <p:nvPr>
-            <p:ph idx="1"/>
-          </p:nvPr>
-        </p:nvSpPr>
-        <p:spPr>
-          <a:xfrm>
-            <a:off x="1089660" y="571502"/>
-            <a:ext cx="10797540" cy="5143499"/>
-          </a:xfrm>
-        </p:spPr>
-        <p:txBody>
-          <a:bodyPr>
-            <a:normAutofit/>
-          </a:bodyPr>
-          <a:lstStyle/>
-          <a:p>
-            <a:r>
-              <a:rPr lang="en-US" sz="2800" dirty="0">
-                <a:latin typeface="Times New Roman" pitchFamily="18" charset="0"/>
-                <a:cs typeface="Times New Roman" pitchFamily="18" charset="0"/>
-              </a:rPr>
-              <a:t>can have methods, fields, indexers, properties, operator methods, and events</a:t>
-            </a:r>
-          </a:p>
-          <a:p>
-            <a:r>
-              <a:rPr lang="en-US" sz="2800" dirty="0">
-                <a:latin typeface="Times New Roman" pitchFamily="18" charset="0"/>
-                <a:cs typeface="Times New Roman" pitchFamily="18" charset="0"/>
-              </a:rPr>
-              <a:t>can have defined constructors(parameterized constructor only, but not destructors).</a:t>
-            </a:r>
-          </a:p>
-          <a:p>
-            <a:r>
-              <a:rPr lang="en-US" sz="2800" dirty="0">
-                <a:solidFill>
-                  <a:srgbClr val="FF0000"/>
-                </a:solidFill>
-                <a:latin typeface="Times New Roman" pitchFamily="18" charset="0"/>
-                <a:cs typeface="Times New Roman" pitchFamily="18" charset="0"/>
-              </a:rPr>
-              <a:t>cannot define a default constructor</a:t>
-            </a:r>
-            <a:r>
-              <a:rPr lang="en-US" sz="2800" dirty="0">
-                <a:latin typeface="Times New Roman" pitchFamily="18" charset="0"/>
-                <a:cs typeface="Times New Roman" pitchFamily="18" charset="0"/>
-              </a:rPr>
-              <a:t> for a structure.</a:t>
-            </a:r>
-          </a:p>
-          <a:p>
-            <a:r>
-              <a:rPr lang="en-US" sz="2800" dirty="0"/>
-              <a:t>structures </a:t>
-            </a:r>
-            <a:r>
-              <a:rPr lang="en-US" sz="2800" dirty="0">
-                <a:solidFill>
-                  <a:srgbClr val="FF0000"/>
-                </a:solidFill>
-              </a:rPr>
-              <a:t>cannot inherit </a:t>
-            </a:r>
-            <a:r>
-              <a:rPr lang="en-US" sz="2800" dirty="0"/>
-              <a:t>other structures or classes.</a:t>
-            </a:r>
-          </a:p>
-          <a:p>
-            <a:r>
-              <a:rPr lang="en-US" sz="2800" dirty="0"/>
-              <a:t>can implement one or more interfaces.</a:t>
-            </a:r>
-          </a:p>
-          <a:p>
-            <a:r>
-              <a:rPr lang="en-US" sz="2800" dirty="0"/>
-              <a:t>structure can be instantiated without using the New operator.</a:t>
-            </a:r>
-          </a:p>
-          <a:p>
-            <a:r>
-              <a:rPr lang="en-US" sz="2800" dirty="0"/>
-              <a:t>If the New operator is not used, the fields remain unassigned and the object cannot be used until all the fields are initialized.</a:t>
-            </a:r>
-            <a:endParaRPr lang="en-US" sz="2800" dirty="0">
-              <a:latin typeface="Times New Roman" pitchFamily="18" charset="0"/>
-              <a:cs typeface="Times New Roman" pitchFamily="18" charset="0"/>
-            </a:endParaRPr>
-          </a:p>
-        </p:txBody>
-      </p:sp>
-    </p:spTree>
   </p:cSld>
   <p:clrMapOvr>
     <a:masterClrMapping/>

</xml_diff>